<commit_message>
Remove fish from title slide
</commit_message>
<xml_diff>
--- a/SeasonRecap.pptx
+++ b/SeasonRecap.pptx
@@ -417,7 +417,7 @@
   <p:cSld>
     <p:spTree>
       <p:nvGrpSpPr>
-        <p:cNvPr id="39" name="Shape 39"/>
+        <p:cNvPr id="38" name="Shape 38"/>
         <p:cNvGrpSpPr/>
         <p:nvPr/>
       </p:nvGrpSpPr>
@@ -431,7 +431,7 @@
       </p:grpSpPr>
       <p:sp>
         <p:nvSpPr>
-          <p:cNvPr id="40" name="Shape 40"/>
+          <p:cNvPr id="39" name="Shape 39"/>
           <p:cNvSpPr/>
           <p:nvPr>
             <p:ph idx="2" type="sldImg"/>
@@ -475,7 +475,7 @@
       </p:sp>
       <p:sp>
         <p:nvSpPr>
-          <p:cNvPr id="41" name="Shape 41"/>
+          <p:cNvPr id="40" name="Shape 40"/>
           <p:cNvSpPr txBox="1"/>
           <p:nvPr>
             <p:ph idx="1" type="body"/>
@@ -522,7 +522,7 @@
   <p:cSld>
     <p:spTree>
       <p:nvGrpSpPr>
-        <p:cNvPr id="97" name="Shape 97"/>
+        <p:cNvPr id="96" name="Shape 96"/>
         <p:cNvGrpSpPr/>
         <p:nvPr/>
       </p:nvGrpSpPr>
@@ -536,7 +536,7 @@
       </p:grpSpPr>
       <p:sp>
         <p:nvSpPr>
-          <p:cNvPr id="98" name="Shape 98"/>
+          <p:cNvPr id="97" name="Shape 97"/>
           <p:cNvSpPr txBox="1"/>
           <p:nvPr>
             <p:ph idx="1" type="body"/>
@@ -572,7 +572,7 @@
       </p:sp>
       <p:sp>
         <p:nvSpPr>
-          <p:cNvPr id="99" name="Shape 99"/>
+          <p:cNvPr id="98" name="Shape 98"/>
           <p:cNvSpPr/>
           <p:nvPr>
             <p:ph idx="2" type="sldImg"/>
@@ -627,7 +627,7 @@
   <p:cSld>
     <p:spTree>
       <p:nvGrpSpPr>
-        <p:cNvPr id="104" name="Shape 104"/>
+        <p:cNvPr id="103" name="Shape 103"/>
         <p:cNvGrpSpPr/>
         <p:nvPr/>
       </p:nvGrpSpPr>
@@ -641,7 +641,7 @@
       </p:grpSpPr>
       <p:sp>
         <p:nvSpPr>
-          <p:cNvPr id="105" name="Shape 105"/>
+          <p:cNvPr id="104" name="Shape 104"/>
           <p:cNvSpPr txBox="1"/>
           <p:nvPr>
             <p:ph idx="1" type="body"/>
@@ -677,7 +677,7 @@
       </p:sp>
       <p:sp>
         <p:nvSpPr>
-          <p:cNvPr id="106" name="Shape 106"/>
+          <p:cNvPr id="105" name="Shape 105"/>
           <p:cNvSpPr/>
           <p:nvPr>
             <p:ph idx="2" type="sldImg"/>
@@ -732,7 +732,7 @@
   <p:cSld>
     <p:spTree>
       <p:nvGrpSpPr>
-        <p:cNvPr id="111" name="Shape 111"/>
+        <p:cNvPr id="110" name="Shape 110"/>
         <p:cNvGrpSpPr/>
         <p:nvPr/>
       </p:nvGrpSpPr>
@@ -746,7 +746,7 @@
       </p:grpSpPr>
       <p:sp>
         <p:nvSpPr>
-          <p:cNvPr id="112" name="Shape 112"/>
+          <p:cNvPr id="111" name="Shape 111"/>
           <p:cNvSpPr txBox="1"/>
           <p:nvPr>
             <p:ph idx="1" type="body"/>
@@ -782,7 +782,7 @@
       </p:sp>
       <p:sp>
         <p:nvSpPr>
-          <p:cNvPr id="113" name="Shape 113"/>
+          <p:cNvPr id="112" name="Shape 112"/>
           <p:cNvSpPr/>
           <p:nvPr>
             <p:ph idx="2" type="sldImg"/>
@@ -837,7 +837,7 @@
   <p:cSld>
     <p:spTree>
       <p:nvGrpSpPr>
-        <p:cNvPr id="117" name="Shape 117"/>
+        <p:cNvPr id="116" name="Shape 116"/>
         <p:cNvGrpSpPr/>
         <p:nvPr/>
       </p:nvGrpSpPr>
@@ -851,7 +851,7 @@
       </p:grpSpPr>
       <p:sp>
         <p:nvSpPr>
-          <p:cNvPr id="118" name="Shape 118"/>
+          <p:cNvPr id="117" name="Shape 117"/>
           <p:cNvSpPr txBox="1"/>
           <p:nvPr>
             <p:ph idx="1" type="body"/>
@@ -887,7 +887,7 @@
       </p:sp>
       <p:sp>
         <p:nvSpPr>
-          <p:cNvPr id="119" name="Shape 119"/>
+          <p:cNvPr id="118" name="Shape 118"/>
           <p:cNvSpPr/>
           <p:nvPr>
             <p:ph idx="2" type="sldImg"/>
@@ -942,7 +942,7 @@
   <p:cSld>
     <p:spTree>
       <p:nvGrpSpPr>
-        <p:cNvPr id="124" name="Shape 124"/>
+        <p:cNvPr id="123" name="Shape 123"/>
         <p:cNvGrpSpPr/>
         <p:nvPr/>
       </p:nvGrpSpPr>
@@ -956,7 +956,7 @@
       </p:grpSpPr>
       <p:sp>
         <p:nvSpPr>
-          <p:cNvPr id="125" name="Shape 125"/>
+          <p:cNvPr id="124" name="Shape 124"/>
           <p:cNvSpPr/>
           <p:nvPr>
             <p:ph idx="2" type="sldImg"/>
@@ -1000,7 +1000,7 @@
       </p:sp>
       <p:sp>
         <p:nvSpPr>
-          <p:cNvPr id="126" name="Shape 126"/>
+          <p:cNvPr id="125" name="Shape 125"/>
           <p:cNvSpPr txBox="1"/>
           <p:nvPr>
             <p:ph idx="1" type="body"/>
@@ -1047,7 +1047,7 @@
   <p:cSld>
     <p:spTree>
       <p:nvGrpSpPr>
-        <p:cNvPr id="130" name="Shape 130"/>
+        <p:cNvPr id="129" name="Shape 129"/>
         <p:cNvGrpSpPr/>
         <p:nvPr/>
       </p:nvGrpSpPr>
@@ -1061,7 +1061,7 @@
       </p:grpSpPr>
       <p:sp>
         <p:nvSpPr>
-          <p:cNvPr id="131" name="Shape 131"/>
+          <p:cNvPr id="130" name="Shape 130"/>
           <p:cNvSpPr txBox="1"/>
           <p:nvPr>
             <p:ph idx="1" type="body"/>
@@ -1097,7 +1097,7 @@
       </p:sp>
       <p:sp>
         <p:nvSpPr>
-          <p:cNvPr id="132" name="Shape 132"/>
+          <p:cNvPr id="131" name="Shape 131"/>
           <p:cNvSpPr/>
           <p:nvPr>
             <p:ph idx="2" type="sldImg"/>
@@ -1152,7 +1152,7 @@
   <p:cSld>
     <p:spTree>
       <p:nvGrpSpPr>
-        <p:cNvPr id="137" name="Shape 137"/>
+        <p:cNvPr id="136" name="Shape 136"/>
         <p:cNvGrpSpPr/>
         <p:nvPr/>
       </p:nvGrpSpPr>
@@ -1166,7 +1166,7 @@
       </p:grpSpPr>
       <p:sp>
         <p:nvSpPr>
-          <p:cNvPr id="138" name="Shape 138"/>
+          <p:cNvPr id="137" name="Shape 137"/>
           <p:cNvSpPr txBox="1"/>
           <p:nvPr>
             <p:ph idx="1" type="body"/>
@@ -1202,7 +1202,7 @@
       </p:sp>
       <p:sp>
         <p:nvSpPr>
-          <p:cNvPr id="139" name="Shape 139"/>
+          <p:cNvPr id="138" name="Shape 138"/>
           <p:cNvSpPr/>
           <p:nvPr>
             <p:ph idx="2" type="sldImg"/>
@@ -1257,7 +1257,7 @@
   <p:cSld>
     <p:spTree>
       <p:nvGrpSpPr>
-        <p:cNvPr id="144" name="Shape 144"/>
+        <p:cNvPr id="143" name="Shape 143"/>
         <p:cNvGrpSpPr/>
         <p:nvPr/>
       </p:nvGrpSpPr>
@@ -1271,7 +1271,7 @@
       </p:grpSpPr>
       <p:sp>
         <p:nvSpPr>
-          <p:cNvPr id="145" name="Shape 145"/>
+          <p:cNvPr id="144" name="Shape 144"/>
           <p:cNvSpPr txBox="1"/>
           <p:nvPr>
             <p:ph idx="1" type="body"/>
@@ -1307,7 +1307,7 @@
       </p:sp>
       <p:sp>
         <p:nvSpPr>
-          <p:cNvPr id="146" name="Shape 146"/>
+          <p:cNvPr id="145" name="Shape 145"/>
           <p:cNvSpPr/>
           <p:nvPr>
             <p:ph idx="2" type="sldImg"/>
@@ -1362,7 +1362,7 @@
   <p:cSld>
     <p:spTree>
       <p:nvGrpSpPr>
-        <p:cNvPr id="150" name="Shape 150"/>
+        <p:cNvPr id="149" name="Shape 149"/>
         <p:cNvGrpSpPr/>
         <p:nvPr/>
       </p:nvGrpSpPr>
@@ -1376,7 +1376,7 @@
       </p:grpSpPr>
       <p:sp>
         <p:nvSpPr>
-          <p:cNvPr id="151" name="Shape 151"/>
+          <p:cNvPr id="150" name="Shape 150"/>
           <p:cNvSpPr txBox="1"/>
           <p:nvPr>
             <p:ph idx="1" type="body"/>
@@ -1412,7 +1412,7 @@
       </p:sp>
       <p:sp>
         <p:nvSpPr>
-          <p:cNvPr id="152" name="Shape 152"/>
+          <p:cNvPr id="151" name="Shape 151"/>
           <p:cNvSpPr/>
           <p:nvPr>
             <p:ph idx="2" type="sldImg"/>
@@ -1467,7 +1467,7 @@
   <p:cSld>
     <p:spTree>
       <p:nvGrpSpPr>
-        <p:cNvPr id="156" name="Shape 156"/>
+        <p:cNvPr id="155" name="Shape 155"/>
         <p:cNvGrpSpPr/>
         <p:nvPr/>
       </p:nvGrpSpPr>
@@ -1481,7 +1481,7 @@
       </p:grpSpPr>
       <p:sp>
         <p:nvSpPr>
-          <p:cNvPr id="157" name="Shape 157"/>
+          <p:cNvPr id="156" name="Shape 156"/>
           <p:cNvSpPr txBox="1"/>
           <p:nvPr>
             <p:ph idx="1" type="body"/>
@@ -1517,7 +1517,7 @@
       </p:sp>
       <p:sp>
         <p:nvSpPr>
-          <p:cNvPr id="158" name="Shape 158"/>
+          <p:cNvPr id="157" name="Shape 157"/>
           <p:cNvSpPr/>
           <p:nvPr>
             <p:ph idx="2" type="sldImg"/>
@@ -1572,7 +1572,7 @@
   <p:cSld>
     <p:spTree>
       <p:nvGrpSpPr>
-        <p:cNvPr id="45" name="Shape 45"/>
+        <p:cNvPr id="44" name="Shape 44"/>
         <p:cNvGrpSpPr/>
         <p:nvPr/>
       </p:nvGrpSpPr>
@@ -1586,7 +1586,7 @@
       </p:grpSpPr>
       <p:sp>
         <p:nvSpPr>
-          <p:cNvPr id="46" name="Shape 46"/>
+          <p:cNvPr id="45" name="Shape 45"/>
           <p:cNvSpPr/>
           <p:nvPr>
             <p:ph idx="2" type="sldImg"/>
@@ -1630,7 +1630,7 @@
       </p:sp>
       <p:sp>
         <p:nvSpPr>
-          <p:cNvPr id="47" name="Shape 47"/>
+          <p:cNvPr id="46" name="Shape 46"/>
           <p:cNvSpPr txBox="1"/>
           <p:nvPr>
             <p:ph idx="1" type="body"/>
@@ -1677,7 +1677,7 @@
   <p:cSld>
     <p:spTree>
       <p:nvGrpSpPr>
-        <p:cNvPr id="162" name="Shape 162"/>
+        <p:cNvPr id="161" name="Shape 161"/>
         <p:cNvGrpSpPr/>
         <p:nvPr/>
       </p:nvGrpSpPr>
@@ -1691,7 +1691,7 @@
       </p:grpSpPr>
       <p:sp>
         <p:nvSpPr>
-          <p:cNvPr id="163" name="Shape 163"/>
+          <p:cNvPr id="162" name="Shape 162"/>
           <p:cNvSpPr/>
           <p:nvPr>
             <p:ph idx="2" type="sldImg"/>
@@ -1735,7 +1735,7 @@
       </p:sp>
       <p:sp>
         <p:nvSpPr>
-          <p:cNvPr id="164" name="Shape 164"/>
+          <p:cNvPr id="163" name="Shape 163"/>
           <p:cNvSpPr txBox="1"/>
           <p:nvPr>
             <p:ph idx="1" type="body"/>
@@ -1782,7 +1782,7 @@
   <p:cSld>
     <p:spTree>
       <p:nvGrpSpPr>
-        <p:cNvPr id="168" name="Shape 168"/>
+        <p:cNvPr id="167" name="Shape 167"/>
         <p:cNvGrpSpPr/>
         <p:nvPr/>
       </p:nvGrpSpPr>
@@ -1796,7 +1796,7 @@
       </p:grpSpPr>
       <p:sp>
         <p:nvSpPr>
-          <p:cNvPr id="169" name="Shape 169"/>
+          <p:cNvPr id="168" name="Shape 168"/>
           <p:cNvSpPr txBox="1"/>
           <p:nvPr>
             <p:ph idx="1" type="body"/>
@@ -1832,7 +1832,7 @@
       </p:sp>
       <p:sp>
         <p:nvSpPr>
-          <p:cNvPr id="170" name="Shape 170"/>
+          <p:cNvPr id="169" name="Shape 169"/>
           <p:cNvSpPr/>
           <p:nvPr>
             <p:ph idx="2" type="sldImg"/>
@@ -1887,7 +1887,7 @@
   <p:cSld>
     <p:spTree>
       <p:nvGrpSpPr>
-        <p:cNvPr id="175" name="Shape 175"/>
+        <p:cNvPr id="174" name="Shape 174"/>
         <p:cNvGrpSpPr/>
         <p:nvPr/>
       </p:nvGrpSpPr>
@@ -1901,7 +1901,7 @@
       </p:grpSpPr>
       <p:sp>
         <p:nvSpPr>
-          <p:cNvPr id="176" name="Shape 176"/>
+          <p:cNvPr id="175" name="Shape 175"/>
           <p:cNvSpPr txBox="1"/>
           <p:nvPr>
             <p:ph idx="1" type="body"/>
@@ -1937,7 +1937,7 @@
       </p:sp>
       <p:sp>
         <p:nvSpPr>
-          <p:cNvPr id="177" name="Shape 177"/>
+          <p:cNvPr id="176" name="Shape 176"/>
           <p:cNvSpPr/>
           <p:nvPr>
             <p:ph idx="2" type="sldImg"/>
@@ -1992,7 +1992,7 @@
   <p:cSld>
     <p:spTree>
       <p:nvGrpSpPr>
-        <p:cNvPr id="182" name="Shape 182"/>
+        <p:cNvPr id="181" name="Shape 181"/>
         <p:cNvGrpSpPr/>
         <p:nvPr/>
       </p:nvGrpSpPr>
@@ -2006,7 +2006,7 @@
       </p:grpSpPr>
       <p:sp>
         <p:nvSpPr>
-          <p:cNvPr id="183" name="Shape 183"/>
+          <p:cNvPr id="182" name="Shape 182"/>
           <p:cNvSpPr txBox="1"/>
           <p:nvPr>
             <p:ph idx="1" type="body"/>
@@ -2042,7 +2042,7 @@
       </p:sp>
       <p:sp>
         <p:nvSpPr>
-          <p:cNvPr id="184" name="Shape 184"/>
+          <p:cNvPr id="183" name="Shape 183"/>
           <p:cNvSpPr/>
           <p:nvPr>
             <p:ph idx="2" type="sldImg"/>
@@ -2097,7 +2097,7 @@
   <p:cSld>
     <p:spTree>
       <p:nvGrpSpPr>
-        <p:cNvPr id="188" name="Shape 188"/>
+        <p:cNvPr id="187" name="Shape 187"/>
         <p:cNvGrpSpPr/>
         <p:nvPr/>
       </p:nvGrpSpPr>
@@ -2111,7 +2111,7 @@
       </p:grpSpPr>
       <p:sp>
         <p:nvSpPr>
-          <p:cNvPr id="189" name="Shape 189"/>
+          <p:cNvPr id="188" name="Shape 188"/>
           <p:cNvSpPr txBox="1"/>
           <p:nvPr>
             <p:ph idx="1" type="body"/>
@@ -2147,7 +2147,7 @@
       </p:sp>
       <p:sp>
         <p:nvSpPr>
-          <p:cNvPr id="190" name="Shape 190"/>
+          <p:cNvPr id="189" name="Shape 189"/>
           <p:cNvSpPr/>
           <p:nvPr>
             <p:ph idx="2" type="sldImg"/>
@@ -2202,7 +2202,7 @@
   <p:cSld>
     <p:spTree>
       <p:nvGrpSpPr>
-        <p:cNvPr id="194" name="Shape 194"/>
+        <p:cNvPr id="193" name="Shape 193"/>
         <p:cNvGrpSpPr/>
         <p:nvPr/>
       </p:nvGrpSpPr>
@@ -2216,7 +2216,7 @@
       </p:grpSpPr>
       <p:sp>
         <p:nvSpPr>
-          <p:cNvPr id="195" name="Shape 195"/>
+          <p:cNvPr id="194" name="Shape 194"/>
           <p:cNvSpPr txBox="1"/>
           <p:nvPr>
             <p:ph idx="1" type="body"/>
@@ -2252,7 +2252,7 @@
       </p:sp>
       <p:sp>
         <p:nvSpPr>
-          <p:cNvPr id="196" name="Shape 196"/>
+          <p:cNvPr id="195" name="Shape 195"/>
           <p:cNvSpPr/>
           <p:nvPr>
             <p:ph idx="2" type="sldImg"/>
@@ -2307,7 +2307,7 @@
   <p:cSld>
     <p:spTree>
       <p:nvGrpSpPr>
-        <p:cNvPr id="200" name="Shape 200"/>
+        <p:cNvPr id="199" name="Shape 199"/>
         <p:cNvGrpSpPr/>
         <p:nvPr/>
       </p:nvGrpSpPr>
@@ -2321,7 +2321,7 @@
       </p:grpSpPr>
       <p:sp>
         <p:nvSpPr>
-          <p:cNvPr id="201" name="Shape 201"/>
+          <p:cNvPr id="200" name="Shape 200"/>
           <p:cNvSpPr/>
           <p:nvPr>
             <p:ph idx="2" type="sldImg"/>
@@ -2365,7 +2365,7 @@
       </p:sp>
       <p:sp>
         <p:nvSpPr>
-          <p:cNvPr id="202" name="Shape 202"/>
+          <p:cNvPr id="201" name="Shape 201"/>
           <p:cNvSpPr txBox="1"/>
           <p:nvPr>
             <p:ph idx="1" type="body"/>
@@ -2412,7 +2412,7 @@
   <p:cSld>
     <p:spTree>
       <p:nvGrpSpPr>
-        <p:cNvPr id="206" name="Shape 206"/>
+        <p:cNvPr id="205" name="Shape 205"/>
         <p:cNvGrpSpPr/>
         <p:nvPr/>
       </p:nvGrpSpPr>
@@ -2426,7 +2426,7 @@
       </p:grpSpPr>
       <p:sp>
         <p:nvSpPr>
-          <p:cNvPr id="207" name="Shape 207"/>
+          <p:cNvPr id="206" name="Shape 206"/>
           <p:cNvSpPr txBox="1"/>
           <p:nvPr>
             <p:ph idx="1" type="body"/>
@@ -2462,7 +2462,7 @@
       </p:sp>
       <p:sp>
         <p:nvSpPr>
-          <p:cNvPr id="208" name="Shape 208"/>
+          <p:cNvPr id="207" name="Shape 207"/>
           <p:cNvSpPr/>
           <p:nvPr>
             <p:ph idx="2" type="sldImg"/>
@@ -2517,7 +2517,7 @@
   <p:cSld>
     <p:spTree>
       <p:nvGrpSpPr>
-        <p:cNvPr id="213" name="Shape 213"/>
+        <p:cNvPr id="212" name="Shape 212"/>
         <p:cNvGrpSpPr/>
         <p:nvPr/>
       </p:nvGrpSpPr>
@@ -2531,7 +2531,7 @@
       </p:grpSpPr>
       <p:sp>
         <p:nvSpPr>
-          <p:cNvPr id="214" name="Shape 214"/>
+          <p:cNvPr id="213" name="Shape 213"/>
           <p:cNvSpPr txBox="1"/>
           <p:nvPr>
             <p:ph idx="1" type="body"/>
@@ -2567,7 +2567,7 @@
       </p:sp>
       <p:sp>
         <p:nvSpPr>
-          <p:cNvPr id="215" name="Shape 215"/>
+          <p:cNvPr id="214" name="Shape 214"/>
           <p:cNvSpPr/>
           <p:nvPr>
             <p:ph idx="2" type="sldImg"/>
@@ -2622,7 +2622,7 @@
   <p:cSld>
     <p:spTree>
       <p:nvGrpSpPr>
-        <p:cNvPr id="220" name="Shape 220"/>
+        <p:cNvPr id="219" name="Shape 219"/>
         <p:cNvGrpSpPr/>
         <p:nvPr/>
       </p:nvGrpSpPr>
@@ -2636,7 +2636,7 @@
       </p:grpSpPr>
       <p:sp>
         <p:nvSpPr>
-          <p:cNvPr id="221" name="Shape 221"/>
+          <p:cNvPr id="220" name="Shape 220"/>
           <p:cNvSpPr txBox="1"/>
           <p:nvPr>
             <p:ph idx="1" type="body"/>
@@ -2672,7 +2672,7 @@
       </p:sp>
       <p:sp>
         <p:nvSpPr>
-          <p:cNvPr id="222" name="Shape 222"/>
+          <p:cNvPr id="221" name="Shape 221"/>
           <p:cNvSpPr/>
           <p:nvPr>
             <p:ph idx="2" type="sldImg"/>
@@ -2727,7 +2727,7 @@
   <p:cSld>
     <p:spTree>
       <p:nvGrpSpPr>
-        <p:cNvPr id="51" name="Shape 51"/>
+        <p:cNvPr id="50" name="Shape 50"/>
         <p:cNvGrpSpPr/>
         <p:nvPr/>
       </p:nvGrpSpPr>
@@ -2741,7 +2741,7 @@
       </p:grpSpPr>
       <p:sp>
         <p:nvSpPr>
-          <p:cNvPr id="52" name="Shape 52"/>
+          <p:cNvPr id="51" name="Shape 51"/>
           <p:cNvSpPr txBox="1"/>
           <p:nvPr>
             <p:ph idx="1" type="body"/>
@@ -2777,7 +2777,7 @@
       </p:sp>
       <p:sp>
         <p:nvSpPr>
-          <p:cNvPr id="53" name="Shape 53"/>
+          <p:cNvPr id="52" name="Shape 52"/>
           <p:cNvSpPr/>
           <p:nvPr>
             <p:ph idx="2" type="sldImg"/>
@@ -2832,7 +2832,7 @@
   <p:cSld>
     <p:spTree>
       <p:nvGrpSpPr>
-        <p:cNvPr id="226" name="Shape 226"/>
+        <p:cNvPr id="225" name="Shape 225"/>
         <p:cNvGrpSpPr/>
         <p:nvPr/>
       </p:nvGrpSpPr>
@@ -2846,7 +2846,7 @@
       </p:grpSpPr>
       <p:sp>
         <p:nvSpPr>
-          <p:cNvPr id="227" name="Shape 227"/>
+          <p:cNvPr id="226" name="Shape 226"/>
           <p:cNvSpPr txBox="1"/>
           <p:nvPr>
             <p:ph idx="1" type="body"/>
@@ -2882,7 +2882,7 @@
       </p:sp>
       <p:sp>
         <p:nvSpPr>
-          <p:cNvPr id="228" name="Shape 228"/>
+          <p:cNvPr id="227" name="Shape 227"/>
           <p:cNvSpPr/>
           <p:nvPr>
             <p:ph idx="2" type="sldImg"/>
@@ -2937,7 +2937,7 @@
   <p:cSld>
     <p:spTree>
       <p:nvGrpSpPr>
-        <p:cNvPr id="232" name="Shape 232"/>
+        <p:cNvPr id="231" name="Shape 231"/>
         <p:cNvGrpSpPr/>
         <p:nvPr/>
       </p:nvGrpSpPr>
@@ -2951,7 +2951,7 @@
       </p:grpSpPr>
       <p:sp>
         <p:nvSpPr>
-          <p:cNvPr id="233" name="Shape 233"/>
+          <p:cNvPr id="232" name="Shape 232"/>
           <p:cNvSpPr txBox="1"/>
           <p:nvPr>
             <p:ph idx="1" type="body"/>
@@ -2987,7 +2987,7 @@
       </p:sp>
       <p:sp>
         <p:nvSpPr>
-          <p:cNvPr id="234" name="Shape 234"/>
+          <p:cNvPr id="233" name="Shape 233"/>
           <p:cNvSpPr/>
           <p:nvPr>
             <p:ph idx="2" type="sldImg"/>
@@ -3042,7 +3042,7 @@
   <p:cSld>
     <p:spTree>
       <p:nvGrpSpPr>
-        <p:cNvPr id="238" name="Shape 238"/>
+        <p:cNvPr id="237" name="Shape 237"/>
         <p:cNvGrpSpPr/>
         <p:nvPr/>
       </p:nvGrpSpPr>
@@ -3056,7 +3056,7 @@
       </p:grpSpPr>
       <p:sp>
         <p:nvSpPr>
-          <p:cNvPr id="239" name="Shape 239"/>
+          <p:cNvPr id="238" name="Shape 238"/>
           <p:cNvSpPr/>
           <p:nvPr>
             <p:ph idx="2" type="sldImg"/>
@@ -3100,7 +3100,7 @@
       </p:sp>
       <p:sp>
         <p:nvSpPr>
-          <p:cNvPr id="240" name="Shape 240"/>
+          <p:cNvPr id="239" name="Shape 239"/>
           <p:cNvSpPr txBox="1"/>
           <p:nvPr>
             <p:ph idx="1" type="body"/>
@@ -3147,7 +3147,7 @@
   <p:cSld>
     <p:spTree>
       <p:nvGrpSpPr>
-        <p:cNvPr id="244" name="Shape 244"/>
+        <p:cNvPr id="243" name="Shape 243"/>
         <p:cNvGrpSpPr/>
         <p:nvPr/>
       </p:nvGrpSpPr>
@@ -3161,7 +3161,7 @@
       </p:grpSpPr>
       <p:sp>
         <p:nvSpPr>
-          <p:cNvPr id="245" name="Shape 245"/>
+          <p:cNvPr id="244" name="Shape 244"/>
           <p:cNvSpPr txBox="1"/>
           <p:nvPr>
             <p:ph idx="1" type="body"/>
@@ -3197,7 +3197,7 @@
       </p:sp>
       <p:sp>
         <p:nvSpPr>
-          <p:cNvPr id="246" name="Shape 246"/>
+          <p:cNvPr id="245" name="Shape 245"/>
           <p:cNvSpPr/>
           <p:nvPr>
             <p:ph idx="2" type="sldImg"/>
@@ -3252,7 +3252,7 @@
   <p:cSld>
     <p:spTree>
       <p:nvGrpSpPr>
-        <p:cNvPr id="251" name="Shape 251"/>
+        <p:cNvPr id="250" name="Shape 250"/>
         <p:cNvGrpSpPr/>
         <p:nvPr/>
       </p:nvGrpSpPr>
@@ -3266,7 +3266,7 @@
       </p:grpSpPr>
       <p:sp>
         <p:nvSpPr>
-          <p:cNvPr id="252" name="Shape 252"/>
+          <p:cNvPr id="251" name="Shape 251"/>
           <p:cNvSpPr txBox="1"/>
           <p:nvPr>
             <p:ph idx="1" type="body"/>
@@ -3302,7 +3302,7 @@
       </p:sp>
       <p:sp>
         <p:nvSpPr>
-          <p:cNvPr id="253" name="Shape 253"/>
+          <p:cNvPr id="252" name="Shape 252"/>
           <p:cNvSpPr/>
           <p:nvPr>
             <p:ph idx="2" type="sldImg"/>
@@ -3357,7 +3357,7 @@
   <p:cSld>
     <p:spTree>
       <p:nvGrpSpPr>
-        <p:cNvPr id="258" name="Shape 258"/>
+        <p:cNvPr id="257" name="Shape 257"/>
         <p:cNvGrpSpPr/>
         <p:nvPr/>
       </p:nvGrpSpPr>
@@ -3371,7 +3371,7 @@
       </p:grpSpPr>
       <p:sp>
         <p:nvSpPr>
-          <p:cNvPr id="259" name="Shape 259"/>
+          <p:cNvPr id="258" name="Shape 258"/>
           <p:cNvSpPr txBox="1"/>
           <p:nvPr>
             <p:ph idx="1" type="body"/>
@@ -3407,7 +3407,7 @@
       </p:sp>
       <p:sp>
         <p:nvSpPr>
-          <p:cNvPr id="260" name="Shape 260"/>
+          <p:cNvPr id="259" name="Shape 259"/>
           <p:cNvSpPr/>
           <p:nvPr>
             <p:ph idx="2" type="sldImg"/>
@@ -3462,7 +3462,7 @@
   <p:cSld>
     <p:spTree>
       <p:nvGrpSpPr>
-        <p:cNvPr id="265" name="Shape 265"/>
+        <p:cNvPr id="264" name="Shape 264"/>
         <p:cNvGrpSpPr/>
         <p:nvPr/>
       </p:nvGrpSpPr>
@@ -3476,7 +3476,7 @@
       </p:grpSpPr>
       <p:sp>
         <p:nvSpPr>
-          <p:cNvPr id="266" name="Shape 266"/>
+          <p:cNvPr id="265" name="Shape 265"/>
           <p:cNvSpPr txBox="1"/>
           <p:nvPr>
             <p:ph idx="1" type="body"/>
@@ -3512,7 +3512,7 @@
       </p:sp>
       <p:sp>
         <p:nvSpPr>
-          <p:cNvPr id="267" name="Shape 267"/>
+          <p:cNvPr id="266" name="Shape 266"/>
           <p:cNvSpPr/>
           <p:nvPr>
             <p:ph idx="2" type="sldImg"/>
@@ -3567,7 +3567,7 @@
   <p:cSld>
     <p:spTree>
       <p:nvGrpSpPr>
-        <p:cNvPr id="271" name="Shape 271"/>
+        <p:cNvPr id="270" name="Shape 270"/>
         <p:cNvGrpSpPr/>
         <p:nvPr/>
       </p:nvGrpSpPr>
@@ -3581,7 +3581,7 @@
       </p:grpSpPr>
       <p:sp>
         <p:nvSpPr>
-          <p:cNvPr id="272" name="Shape 272"/>
+          <p:cNvPr id="271" name="Shape 271"/>
           <p:cNvSpPr txBox="1"/>
           <p:nvPr>
             <p:ph idx="1" type="body"/>
@@ -3617,7 +3617,7 @@
       </p:sp>
       <p:sp>
         <p:nvSpPr>
-          <p:cNvPr id="273" name="Shape 273"/>
+          <p:cNvPr id="272" name="Shape 272"/>
           <p:cNvSpPr/>
           <p:nvPr>
             <p:ph idx="2" type="sldImg"/>
@@ -3672,7 +3672,7 @@
   <p:cSld>
     <p:spTree>
       <p:nvGrpSpPr>
-        <p:cNvPr id="279" name="Shape 279"/>
+        <p:cNvPr id="278" name="Shape 278"/>
         <p:cNvGrpSpPr/>
         <p:nvPr/>
       </p:nvGrpSpPr>
@@ -3686,7 +3686,7 @@
       </p:grpSpPr>
       <p:sp>
         <p:nvSpPr>
-          <p:cNvPr id="280" name="Shape 280"/>
+          <p:cNvPr id="279" name="Shape 279"/>
           <p:cNvSpPr/>
           <p:nvPr>
             <p:ph idx="2" type="sldImg"/>
@@ -3730,7 +3730,7 @@
       </p:sp>
       <p:sp>
         <p:nvSpPr>
-          <p:cNvPr id="281" name="Shape 281"/>
+          <p:cNvPr id="280" name="Shape 280"/>
           <p:cNvSpPr txBox="1"/>
           <p:nvPr>
             <p:ph idx="1" type="body"/>
@@ -3777,7 +3777,7 @@
   <p:cSld>
     <p:spTree>
       <p:nvGrpSpPr>
-        <p:cNvPr id="58" name="Shape 58"/>
+        <p:cNvPr id="57" name="Shape 57"/>
         <p:cNvGrpSpPr/>
         <p:nvPr/>
       </p:nvGrpSpPr>
@@ -3791,7 +3791,7 @@
       </p:grpSpPr>
       <p:sp>
         <p:nvSpPr>
-          <p:cNvPr id="59" name="Shape 59"/>
+          <p:cNvPr id="58" name="Shape 58"/>
           <p:cNvSpPr txBox="1"/>
           <p:nvPr>
             <p:ph idx="1" type="body"/>
@@ -3827,7 +3827,7 @@
       </p:sp>
       <p:sp>
         <p:nvSpPr>
-          <p:cNvPr id="60" name="Shape 60"/>
+          <p:cNvPr id="59" name="Shape 59"/>
           <p:cNvSpPr/>
           <p:nvPr>
             <p:ph idx="2" type="sldImg"/>
@@ -3882,7 +3882,7 @@
   <p:cSld>
     <p:spTree>
       <p:nvGrpSpPr>
-        <p:cNvPr id="65" name="Shape 65"/>
+        <p:cNvPr id="64" name="Shape 64"/>
         <p:cNvGrpSpPr/>
         <p:nvPr/>
       </p:nvGrpSpPr>
@@ -3896,7 +3896,7 @@
       </p:grpSpPr>
       <p:sp>
         <p:nvSpPr>
-          <p:cNvPr id="66" name="Shape 66"/>
+          <p:cNvPr id="65" name="Shape 65"/>
           <p:cNvSpPr txBox="1"/>
           <p:nvPr>
             <p:ph idx="1" type="body"/>
@@ -3932,7 +3932,7 @@
       </p:sp>
       <p:sp>
         <p:nvSpPr>
-          <p:cNvPr id="67" name="Shape 67"/>
+          <p:cNvPr id="66" name="Shape 66"/>
           <p:cNvSpPr/>
           <p:nvPr>
             <p:ph idx="2" type="sldImg"/>
@@ -3987,7 +3987,7 @@
   <p:cSld>
     <p:spTree>
       <p:nvGrpSpPr>
-        <p:cNvPr id="71" name="Shape 71"/>
+        <p:cNvPr id="70" name="Shape 70"/>
         <p:cNvGrpSpPr/>
         <p:nvPr/>
       </p:nvGrpSpPr>
@@ -4001,7 +4001,7 @@
       </p:grpSpPr>
       <p:sp>
         <p:nvSpPr>
-          <p:cNvPr id="72" name="Shape 72"/>
+          <p:cNvPr id="71" name="Shape 71"/>
           <p:cNvSpPr txBox="1"/>
           <p:nvPr>
             <p:ph idx="1" type="body"/>
@@ -4037,7 +4037,7 @@
       </p:sp>
       <p:sp>
         <p:nvSpPr>
-          <p:cNvPr id="73" name="Shape 73"/>
+          <p:cNvPr id="72" name="Shape 72"/>
           <p:cNvSpPr/>
           <p:nvPr>
             <p:ph idx="2" type="sldImg"/>
@@ -4092,7 +4092,7 @@
   <p:cSld>
     <p:spTree>
       <p:nvGrpSpPr>
-        <p:cNvPr id="77" name="Shape 77"/>
+        <p:cNvPr id="76" name="Shape 76"/>
         <p:cNvGrpSpPr/>
         <p:nvPr/>
       </p:nvGrpSpPr>
@@ -4106,7 +4106,7 @@
       </p:grpSpPr>
       <p:sp>
         <p:nvSpPr>
-          <p:cNvPr id="78" name="Shape 78"/>
+          <p:cNvPr id="77" name="Shape 77"/>
           <p:cNvSpPr txBox="1"/>
           <p:nvPr>
             <p:ph idx="1" type="body"/>
@@ -4142,7 +4142,7 @@
       </p:sp>
       <p:sp>
         <p:nvSpPr>
-          <p:cNvPr id="79" name="Shape 79"/>
+          <p:cNvPr id="78" name="Shape 78"/>
           <p:cNvSpPr/>
           <p:nvPr>
             <p:ph idx="2" type="sldImg"/>
@@ -4197,7 +4197,7 @@
   <p:cSld>
     <p:spTree>
       <p:nvGrpSpPr>
-        <p:cNvPr id="84" name="Shape 84"/>
+        <p:cNvPr id="83" name="Shape 83"/>
         <p:cNvGrpSpPr/>
         <p:nvPr/>
       </p:nvGrpSpPr>
@@ -4211,7 +4211,7 @@
       </p:grpSpPr>
       <p:sp>
         <p:nvSpPr>
-          <p:cNvPr id="85" name="Shape 85"/>
+          <p:cNvPr id="84" name="Shape 84"/>
           <p:cNvSpPr/>
           <p:nvPr>
             <p:ph idx="2" type="sldImg"/>
@@ -4255,7 +4255,7 @@
       </p:sp>
       <p:sp>
         <p:nvSpPr>
-          <p:cNvPr id="86" name="Shape 86"/>
+          <p:cNvPr id="85" name="Shape 85"/>
           <p:cNvSpPr txBox="1"/>
           <p:nvPr>
             <p:ph idx="1" type="body"/>
@@ -4302,7 +4302,7 @@
   <p:cSld>
     <p:spTree>
       <p:nvGrpSpPr>
-        <p:cNvPr id="90" name="Shape 90"/>
+        <p:cNvPr id="89" name="Shape 89"/>
         <p:cNvGrpSpPr/>
         <p:nvPr/>
       </p:nvGrpSpPr>
@@ -4316,7 +4316,7 @@
       </p:grpSpPr>
       <p:sp>
         <p:nvSpPr>
-          <p:cNvPr id="91" name="Shape 91"/>
+          <p:cNvPr id="90" name="Shape 90"/>
           <p:cNvSpPr txBox="1"/>
           <p:nvPr>
             <p:ph idx="1" type="body"/>
@@ -4352,7 +4352,7 @@
       </p:sp>
       <p:sp>
         <p:nvSpPr>
-          <p:cNvPr id="92" name="Shape 92"/>
+          <p:cNvPr id="91" name="Shape 91"/>
           <p:cNvSpPr/>
           <p:nvPr>
             <p:ph idx="2" type="sldImg"/>
@@ -7060,34 +7060,6 @@
           </a:p>
         </p:txBody>
       </p:sp>
-      <p:pic>
-        <p:nvPicPr>
-          <p:cNvPr id="38" name="Shape 38"/>
-          <p:cNvPicPr preferRelativeResize="0"/>
-          <p:nvPr/>
-        </p:nvPicPr>
-        <p:blipFill>
-          <a:blip r:embed="rId3">
-            <a:alphaModFix/>
-          </a:blip>
-          <a:stretch>
-            <a:fillRect/>
-          </a:stretch>
-        </p:blipFill>
-        <p:spPr>
-          <a:xfrm>
-            <a:off x="6911750" y="3922425"/>
-            <a:ext cx="674825" cy="330175"/>
-          </a:xfrm>
-          <a:prstGeom prst="rect">
-            <a:avLst/>
-          </a:prstGeom>
-          <a:noFill/>
-          <a:ln>
-            <a:noFill/>
-          </a:ln>
-        </p:spPr>
-      </p:pic>
     </p:spTree>
   </p:cSld>
   <p:clrMapOvr>
@@ -7096,89 +7068,6 @@
   <p:transition spd="slow">
     <p:cut/>
   </p:transition>
-  <p:timing>
-    <p:tnLst>
-      <p:par>
-        <p:cTn dur="indefinite" nodeType="tmRoot" restart="never">
-          <p:childTnLst>
-            <p:seq concurrent="1" nextAc="seek">
-              <p:cTn dur="indefinite" id="2" nodeType="mainSeq">
-                <p:childTnLst>
-                  <p:par>
-                    <p:cTn fill="hold">
-                      <p:stCondLst>
-                        <p:cond delay="indefinite"/>
-                      </p:stCondLst>
-                      <p:childTnLst>
-                        <p:par>
-                          <p:cTn fill="hold">
-                            <p:stCondLst>
-                              <p:cond delay="0"/>
-                            </p:stCondLst>
-                            <p:childTnLst>
-                              <p:par>
-                                <p:cTn fill="hold" nodeType="clickEffect" presetClass="entr" presetID="10" presetSubtype="0">
-                                  <p:stCondLst>
-                                    <p:cond delay="0"/>
-                                  </p:stCondLst>
-                                  <p:childTnLst>
-                                    <p:set>
-                                      <p:cBhvr>
-                                        <p:cTn dur="1" fill="hold">
-                                          <p:stCondLst>
-                                            <p:cond delay="0"/>
-                                          </p:stCondLst>
-                                        </p:cTn>
-                                        <p:tgtEl>
-                                          <p:spTgt spid="38"/>
-                                        </p:tgtEl>
-                                        <p:attrNameLst>
-                                          <p:attrName>style.visibility</p:attrName>
-                                        </p:attrNameLst>
-                                      </p:cBhvr>
-                                      <p:to>
-                                        <p:strVal val="visible"/>
-                                      </p:to>
-                                    </p:set>
-                                    <p:animEffect filter="fade" transition="in">
-                                      <p:cBhvr>
-                                        <p:cTn dur="100"/>
-                                        <p:tgtEl>
-                                          <p:spTgt spid="38"/>
-                                        </p:tgtEl>
-                                      </p:cBhvr>
-                                    </p:animEffect>
-                                  </p:childTnLst>
-                                </p:cTn>
-                              </p:par>
-                            </p:childTnLst>
-                          </p:cTn>
-                        </p:par>
-                      </p:childTnLst>
-                    </p:cTn>
-                  </p:par>
-                </p:childTnLst>
-              </p:cTn>
-              <p:prevCondLst>
-                <p:cond evt="onPrev">
-                  <p:tgtEl>
-                    <p:sldTgt/>
-                  </p:tgtEl>
-                </p:cond>
-              </p:prevCondLst>
-              <p:nextCondLst>
-                <p:cond evt="onNext">
-                  <p:tgtEl>
-                    <p:sldTgt/>
-                  </p:tgtEl>
-                </p:cond>
-              </p:nextCondLst>
-            </p:seq>
-          </p:childTnLst>
-        </p:cTn>
-      </p:par>
-    </p:tnLst>
-  </p:timing>
 </p:sld>
 </file>
 
@@ -7187,7 +7076,7 @@
   <p:cSld>
     <p:spTree>
       <p:nvGrpSpPr>
-        <p:cNvPr id="93" name="Shape 93"/>
+        <p:cNvPr id="92" name="Shape 92"/>
         <p:cNvGrpSpPr/>
         <p:nvPr/>
       </p:nvGrpSpPr>
@@ -7201,7 +7090,7 @@
       </p:grpSpPr>
       <p:sp>
         <p:nvSpPr>
-          <p:cNvPr id="94" name="Shape 94"/>
+          <p:cNvPr id="93" name="Shape 93"/>
           <p:cNvSpPr txBox="1"/>
           <p:nvPr>
             <p:ph type="title"/>
@@ -7266,7 +7155,7 @@
       </p:sp>
       <p:sp>
         <p:nvSpPr>
-          <p:cNvPr id="95" name="Shape 95"/>
+          <p:cNvPr id="94" name="Shape 94"/>
           <p:cNvSpPr txBox="1"/>
           <p:nvPr>
             <p:ph idx="1" type="body"/>
@@ -7334,7 +7223,7 @@
       </p:sp>
       <p:pic>
         <p:nvPicPr>
-          <p:cNvPr id="96" name="Shape 96"/>
+          <p:cNvPr id="95" name="Shape 95"/>
           <p:cNvPicPr preferRelativeResize="0"/>
           <p:nvPr/>
         </p:nvPicPr>
@@ -7401,7 +7290,7 @@
                                       <p:cBhvr>
                                         <p:cTn dur="1000" fill="hold"/>
                                         <p:tgtEl>
-                                          <p:spTgt spid="94"/>
+                                          <p:spTgt spid="93"/>
                                         </p:tgtEl>
                                         <p:attrNameLst>
                                           <p:attrName>r</p:attrName>
@@ -7421,7 +7310,7 @@
                                       <p:cBhvr>
                                         <p:cTn dur="1000" fill="hold"/>
                                         <p:tgtEl>
-                                          <p:spTgt spid="95"/>
+                                          <p:spTgt spid="94"/>
                                         </p:tgtEl>
                                         <p:attrNameLst>
                                           <p:attrName>r</p:attrName>
@@ -7467,7 +7356,7 @@
   <p:cSld>
     <p:spTree>
       <p:nvGrpSpPr>
-        <p:cNvPr id="100" name="Shape 100"/>
+        <p:cNvPr id="99" name="Shape 99"/>
         <p:cNvGrpSpPr/>
         <p:nvPr/>
       </p:nvGrpSpPr>
@@ -7481,7 +7370,7 @@
       </p:grpSpPr>
       <p:sp>
         <p:nvSpPr>
-          <p:cNvPr id="101" name="Shape 101"/>
+          <p:cNvPr id="100" name="Shape 100"/>
           <p:cNvSpPr txBox="1"/>
           <p:nvPr>
             <p:ph type="title"/>
@@ -7565,7 +7454,7 @@
       </p:sp>
       <p:sp>
         <p:nvSpPr>
-          <p:cNvPr id="102" name="Shape 102"/>
+          <p:cNvPr id="101" name="Shape 101"/>
           <p:cNvSpPr txBox="1"/>
           <p:nvPr>
             <p:ph idx="1" type="body"/>
@@ -7618,7 +7507,7 @@
       </p:sp>
       <p:pic>
         <p:nvPicPr>
-          <p:cNvPr id="103" name="Shape 103"/>
+          <p:cNvPr id="102" name="Shape 102"/>
           <p:cNvPicPr preferRelativeResize="0"/>
           <p:nvPr/>
         </p:nvPicPr>
@@ -7660,7 +7549,7 @@
   <p:cSld>
     <p:spTree>
       <p:nvGrpSpPr>
-        <p:cNvPr id="107" name="Shape 107"/>
+        <p:cNvPr id="106" name="Shape 106"/>
         <p:cNvGrpSpPr/>
         <p:nvPr/>
       </p:nvGrpSpPr>
@@ -7674,7 +7563,7 @@
       </p:grpSpPr>
       <p:sp>
         <p:nvSpPr>
-          <p:cNvPr id="108" name="Shape 108"/>
+          <p:cNvPr id="107" name="Shape 107"/>
           <p:cNvSpPr txBox="1"/>
           <p:nvPr>
             <p:ph type="title"/>
@@ -7739,7 +7628,7 @@
       </p:sp>
       <p:sp>
         <p:nvSpPr>
-          <p:cNvPr id="109" name="Shape 109"/>
+          <p:cNvPr id="108" name="Shape 108"/>
           <p:cNvSpPr txBox="1"/>
           <p:nvPr>
             <p:ph idx="1" type="body"/>
@@ -7832,7 +7721,7 @@
       </p:sp>
       <p:pic>
         <p:nvPicPr>
-          <p:cNvPr id="110" name="Shape 110"/>
+          <p:cNvPr id="109" name="Shape 109"/>
           <p:cNvPicPr preferRelativeResize="0"/>
           <p:nvPr/>
         </p:nvPicPr>
@@ -7874,7 +7763,7 @@
   <p:cSld>
     <p:spTree>
       <p:nvGrpSpPr>
-        <p:cNvPr id="114" name="Shape 114"/>
+        <p:cNvPr id="113" name="Shape 113"/>
         <p:cNvGrpSpPr/>
         <p:nvPr/>
       </p:nvGrpSpPr>
@@ -7888,7 +7777,7 @@
       </p:grpSpPr>
       <p:sp>
         <p:nvSpPr>
-          <p:cNvPr id="115" name="Shape 115"/>
+          <p:cNvPr id="114" name="Shape 114"/>
           <p:cNvSpPr txBox="1"/>
           <p:nvPr>
             <p:ph type="title"/>
@@ -7944,7 +7833,7 @@
       </p:sp>
       <p:sp>
         <p:nvSpPr>
-          <p:cNvPr id="116" name="Shape 116"/>
+          <p:cNvPr id="115" name="Shape 115"/>
           <p:cNvSpPr txBox="1"/>
           <p:nvPr>
             <p:ph idx="1" type="body"/>
@@ -8011,7 +7900,7 @@
   <p:cSld>
     <p:spTree>
       <p:nvGrpSpPr>
-        <p:cNvPr id="120" name="Shape 120"/>
+        <p:cNvPr id="119" name="Shape 119"/>
         <p:cNvGrpSpPr/>
         <p:nvPr/>
       </p:nvGrpSpPr>
@@ -8025,7 +7914,7 @@
       </p:grpSpPr>
       <p:sp>
         <p:nvSpPr>
-          <p:cNvPr id="121" name="Shape 121"/>
+          <p:cNvPr id="120" name="Shape 120"/>
           <p:cNvSpPr txBox="1"/>
           <p:nvPr>
             <p:ph type="title"/>
@@ -8061,7 +7950,7 @@
       </p:sp>
       <p:sp>
         <p:nvSpPr>
-          <p:cNvPr id="122" name="Shape 122"/>
+          <p:cNvPr id="121" name="Shape 121"/>
           <p:cNvSpPr txBox="1"/>
           <p:nvPr>
             <p:ph idx="1" type="body"/>
@@ -8097,7 +7986,7 @@
       </p:sp>
       <p:pic>
         <p:nvPicPr>
-          <p:cNvPr id="123" name="Shape 123"/>
+          <p:cNvPr id="122" name="Shape 122"/>
           <p:cNvPicPr preferRelativeResize="0"/>
           <p:nvPr/>
         </p:nvPicPr>
@@ -8139,7 +8028,7 @@
   <p:cSld>
     <p:spTree>
       <p:nvGrpSpPr>
-        <p:cNvPr id="127" name="Shape 127"/>
+        <p:cNvPr id="126" name="Shape 126"/>
         <p:cNvGrpSpPr/>
         <p:nvPr/>
       </p:nvGrpSpPr>
@@ -8153,7 +8042,7 @@
       </p:grpSpPr>
       <p:sp>
         <p:nvSpPr>
-          <p:cNvPr id="128" name="Shape 128"/>
+          <p:cNvPr id="127" name="Shape 127"/>
           <p:cNvSpPr txBox="1"/>
           <p:nvPr>
             <p:ph type="title"/>
@@ -8218,7 +8107,7 @@
       </p:sp>
       <p:sp>
         <p:nvSpPr>
-          <p:cNvPr id="129" name="Shape 129"/>
+          <p:cNvPr id="128" name="Shape 128"/>
           <p:cNvSpPr txBox="1"/>
           <p:nvPr>
             <p:ph idx="1" type="body"/>
@@ -8280,7 +8169,7 @@
   <p:cSld>
     <p:spTree>
       <p:nvGrpSpPr>
-        <p:cNvPr id="133" name="Shape 133"/>
+        <p:cNvPr id="132" name="Shape 132"/>
         <p:cNvGrpSpPr/>
         <p:nvPr/>
       </p:nvGrpSpPr>
@@ -8294,7 +8183,7 @@
       </p:grpSpPr>
       <p:sp>
         <p:nvSpPr>
-          <p:cNvPr id="134" name="Shape 134"/>
+          <p:cNvPr id="133" name="Shape 133"/>
           <p:cNvSpPr txBox="1"/>
           <p:nvPr>
             <p:ph type="title"/>
@@ -8375,7 +8264,7 @@
       </p:sp>
       <p:sp>
         <p:nvSpPr>
-          <p:cNvPr id="135" name="Shape 135"/>
+          <p:cNvPr id="134" name="Shape 134"/>
           <p:cNvSpPr txBox="1"/>
           <p:nvPr>
             <p:ph idx="1" type="body"/>
@@ -8423,7 +8312,7 @@
       </p:sp>
       <p:pic>
         <p:nvPicPr>
-          <p:cNvPr id="136" name="Shape 136"/>
+          <p:cNvPr id="135" name="Shape 135"/>
           <p:cNvPicPr preferRelativeResize="0"/>
           <p:nvPr/>
         </p:nvPicPr>
@@ -8482,6 +8371,79 @@
                             <p:childTnLst>
                               <p:par>
                                 <p:cTn fill="hold" nodeType="afterEffect" presetClass="entr" presetID="23" presetSubtype="16">
+                                  <p:stCondLst>
+                                    <p:cond delay="0"/>
+                                  </p:stCondLst>
+                                  <p:childTnLst>
+                                    <p:set>
+                                      <p:cBhvr>
+                                        <p:cTn dur="1" fill="hold">
+                                          <p:stCondLst>
+                                            <p:cond delay="0"/>
+                                          </p:stCondLst>
+                                        </p:cTn>
+                                        <p:tgtEl>
+                                          <p:spTgt spid="133"/>
+                                        </p:tgtEl>
+                                        <p:attrNameLst>
+                                          <p:attrName>style.visibility</p:attrName>
+                                        </p:attrNameLst>
+                                      </p:cBhvr>
+                                      <p:to>
+                                        <p:strVal val="visible"/>
+                                      </p:to>
+                                    </p:set>
+                                    <p:anim calcmode="lin" valueType="num">
+                                      <p:cBhvr additive="base">
+                                        <p:cTn dur="1000"/>
+                                        <p:tgtEl>
+                                          <p:spTgt spid="133"/>
+                                        </p:tgtEl>
+                                        <p:attrNameLst>
+                                          <p:attrName>ppt_w</p:attrName>
+                                        </p:attrNameLst>
+                                      </p:cBhvr>
+                                      <p:tavLst>
+                                        <p:tav fmla="" tm="0">
+                                          <p:val>
+                                            <p:strVal val="0"/>
+                                          </p:val>
+                                        </p:tav>
+                                        <p:tav fmla="" tm="100000">
+                                          <p:val>
+                                            <p:strVal val="#ppt_w"/>
+                                          </p:val>
+                                        </p:tav>
+                                      </p:tavLst>
+                                    </p:anim>
+                                    <p:anim calcmode="lin" valueType="num">
+                                      <p:cBhvr additive="base">
+                                        <p:cTn dur="1000"/>
+                                        <p:tgtEl>
+                                          <p:spTgt spid="133"/>
+                                        </p:tgtEl>
+                                        <p:attrNameLst>
+                                          <p:attrName>ppt_h</p:attrName>
+                                        </p:attrNameLst>
+                                      </p:cBhvr>
+                                      <p:tavLst>
+                                        <p:tav fmla="" tm="0">
+                                          <p:val>
+                                            <p:strVal val="0"/>
+                                          </p:val>
+                                        </p:tav>
+                                        <p:tav fmla="" tm="100000">
+                                          <p:val>
+                                            <p:strVal val="#ppt_h"/>
+                                          </p:val>
+                                        </p:tav>
+                                      </p:tavLst>
+                                    </p:anim>
+                                  </p:childTnLst>
+                                </p:cTn>
+                              </p:par>
+                              <p:par>
+                                <p:cTn fill="hold" nodeType="withEffect" presetClass="entr" presetID="23" presetSubtype="16">
                                   <p:stCondLst>
                                     <p:cond delay="0"/>
                                   </p:stCondLst>
@@ -8553,79 +8515,6 @@
                                   </p:childTnLst>
                                 </p:cTn>
                               </p:par>
-                              <p:par>
-                                <p:cTn fill="hold" nodeType="withEffect" presetClass="entr" presetID="23" presetSubtype="16">
-                                  <p:stCondLst>
-                                    <p:cond delay="0"/>
-                                  </p:stCondLst>
-                                  <p:childTnLst>
-                                    <p:set>
-                                      <p:cBhvr>
-                                        <p:cTn dur="1" fill="hold">
-                                          <p:stCondLst>
-                                            <p:cond delay="0"/>
-                                          </p:stCondLst>
-                                        </p:cTn>
-                                        <p:tgtEl>
-                                          <p:spTgt spid="135"/>
-                                        </p:tgtEl>
-                                        <p:attrNameLst>
-                                          <p:attrName>style.visibility</p:attrName>
-                                        </p:attrNameLst>
-                                      </p:cBhvr>
-                                      <p:to>
-                                        <p:strVal val="visible"/>
-                                      </p:to>
-                                    </p:set>
-                                    <p:anim calcmode="lin" valueType="num">
-                                      <p:cBhvr additive="base">
-                                        <p:cTn dur="1000"/>
-                                        <p:tgtEl>
-                                          <p:spTgt spid="135"/>
-                                        </p:tgtEl>
-                                        <p:attrNameLst>
-                                          <p:attrName>ppt_w</p:attrName>
-                                        </p:attrNameLst>
-                                      </p:cBhvr>
-                                      <p:tavLst>
-                                        <p:tav fmla="" tm="0">
-                                          <p:val>
-                                            <p:strVal val="0"/>
-                                          </p:val>
-                                        </p:tav>
-                                        <p:tav fmla="" tm="100000">
-                                          <p:val>
-                                            <p:strVal val="#ppt_w"/>
-                                          </p:val>
-                                        </p:tav>
-                                      </p:tavLst>
-                                    </p:anim>
-                                    <p:anim calcmode="lin" valueType="num">
-                                      <p:cBhvr additive="base">
-                                        <p:cTn dur="1000"/>
-                                        <p:tgtEl>
-                                          <p:spTgt spid="135"/>
-                                        </p:tgtEl>
-                                        <p:attrNameLst>
-                                          <p:attrName>ppt_h</p:attrName>
-                                        </p:attrNameLst>
-                                      </p:cBhvr>
-                                      <p:tavLst>
-                                        <p:tav fmla="" tm="0">
-                                          <p:val>
-                                            <p:strVal val="0"/>
-                                          </p:val>
-                                        </p:tav>
-                                        <p:tav fmla="" tm="100000">
-                                          <p:val>
-                                            <p:strVal val="#ppt_h"/>
-                                          </p:val>
-                                        </p:tav>
-                                      </p:tavLst>
-                                    </p:anim>
-                                  </p:childTnLst>
-                                </p:cTn>
-                              </p:par>
                             </p:childTnLst>
                           </p:cTn>
                         </p:par>
@@ -8658,7 +8547,7 @@
                                           </p:stCondLst>
                                         </p:cTn>
                                         <p:tgtEl>
-                                          <p:spTgt spid="136"/>
+                                          <p:spTgt spid="135"/>
                                         </p:tgtEl>
                                         <p:attrNameLst>
                                           <p:attrName>style.visibility</p:attrName>
@@ -8672,7 +8561,7 @@
                                       <p:cBhvr>
                                         <p:cTn dur="1000"/>
                                         <p:tgtEl>
-                                          <p:spTgt spid="136"/>
+                                          <p:spTgt spid="135"/>
                                         </p:tgtEl>
                                       </p:cBhvr>
                                     </p:animEffect>
@@ -8715,7 +8604,7 @@
   <p:cSld>
     <p:spTree>
       <p:nvGrpSpPr>
-        <p:cNvPr id="140" name="Shape 140"/>
+        <p:cNvPr id="139" name="Shape 139"/>
         <p:cNvGrpSpPr/>
         <p:nvPr/>
       </p:nvGrpSpPr>
@@ -8729,7 +8618,7 @@
       </p:grpSpPr>
       <p:sp>
         <p:nvSpPr>
-          <p:cNvPr id="141" name="Shape 141"/>
+          <p:cNvPr id="140" name="Shape 140"/>
           <p:cNvSpPr txBox="1"/>
           <p:nvPr>
             <p:ph type="title"/>
@@ -8813,7 +8702,7 @@
       </p:sp>
       <p:sp>
         <p:nvSpPr>
-          <p:cNvPr id="142" name="Shape 142"/>
+          <p:cNvPr id="141" name="Shape 141"/>
           <p:cNvSpPr txBox="1"/>
           <p:nvPr>
             <p:ph idx="1" type="body"/>
@@ -8889,7 +8778,7 @@
       </p:sp>
       <p:pic>
         <p:nvPicPr>
-          <p:cNvPr id="143" name="Shape 143"/>
+          <p:cNvPr id="142" name="Shape 142"/>
           <p:cNvPicPr preferRelativeResize="0"/>
           <p:nvPr/>
         </p:nvPicPr>
@@ -8931,7 +8820,7 @@
   <p:cSld>
     <p:spTree>
       <p:nvGrpSpPr>
-        <p:cNvPr id="147" name="Shape 147"/>
+        <p:cNvPr id="146" name="Shape 146"/>
         <p:cNvGrpSpPr/>
         <p:nvPr/>
       </p:nvGrpSpPr>
@@ -8945,7 +8834,7 @@
       </p:grpSpPr>
       <p:sp>
         <p:nvSpPr>
-          <p:cNvPr id="148" name="Shape 148"/>
+          <p:cNvPr id="147" name="Shape 147"/>
           <p:cNvSpPr txBox="1"/>
           <p:nvPr>
             <p:ph type="title"/>
@@ -9001,7 +8890,7 @@
       </p:sp>
       <p:sp>
         <p:nvSpPr>
-          <p:cNvPr id="149" name="Shape 149"/>
+          <p:cNvPr id="148" name="Shape 148"/>
           <p:cNvSpPr txBox="1"/>
           <p:nvPr>
             <p:ph idx="1" type="body"/>
@@ -9091,7 +8980,7 @@
   <p:cSld>
     <p:spTree>
       <p:nvGrpSpPr>
-        <p:cNvPr id="153" name="Shape 153"/>
+        <p:cNvPr id="152" name="Shape 152"/>
         <p:cNvGrpSpPr/>
         <p:nvPr/>
       </p:nvGrpSpPr>
@@ -9105,7 +8994,7 @@
       </p:grpSpPr>
       <p:sp>
         <p:nvSpPr>
-          <p:cNvPr id="154" name="Shape 154"/>
+          <p:cNvPr id="153" name="Shape 153"/>
           <p:cNvSpPr txBox="1"/>
           <p:nvPr>
             <p:ph type="title"/>
@@ -9161,7 +9050,7 @@
       </p:sp>
       <p:sp>
         <p:nvSpPr>
-          <p:cNvPr id="155" name="Shape 155"/>
+          <p:cNvPr id="154" name="Shape 154"/>
           <p:cNvSpPr txBox="1"/>
           <p:nvPr>
             <p:ph idx="1" type="body"/>
@@ -9228,7 +9117,7 @@
   <p:cSld>
     <p:spTree>
       <p:nvGrpSpPr>
-        <p:cNvPr id="42" name="Shape 42"/>
+        <p:cNvPr id="41" name="Shape 41"/>
         <p:cNvGrpSpPr/>
         <p:nvPr/>
       </p:nvGrpSpPr>
@@ -9242,7 +9131,7 @@
       </p:grpSpPr>
       <p:sp>
         <p:nvSpPr>
-          <p:cNvPr id="43" name="Shape 43"/>
+          <p:cNvPr id="42" name="Shape 42"/>
           <p:cNvSpPr txBox="1"/>
           <p:nvPr>
             <p:ph type="title"/>
@@ -9278,7 +9167,7 @@
       </p:sp>
       <p:sp>
         <p:nvSpPr>
-          <p:cNvPr id="44" name="Shape 44"/>
+          <p:cNvPr id="43" name="Shape 43"/>
           <p:cNvSpPr txBox="1"/>
           <p:nvPr/>
         </p:nvSpPr>
@@ -9367,7 +9256,7 @@
                                           </p:stCondLst>
                                         </p:cTn>
                                         <p:tgtEl>
-                                          <p:spTgt spid="44"/>
+                                          <p:spTgt spid="43"/>
                                         </p:tgtEl>
                                         <p:attrNameLst>
                                           <p:attrName>style.visibility</p:attrName>
@@ -9381,7 +9270,7 @@
                                       <p:cBhvr>
                                         <p:cTn dur="1000"/>
                                         <p:tgtEl>
-                                          <p:spTgt spid="44"/>
+                                          <p:spTgt spid="43"/>
                                         </p:tgtEl>
                                       </p:cBhvr>
                                     </p:animEffect>
@@ -9424,7 +9313,7 @@
   <p:cSld>
     <p:spTree>
       <p:nvGrpSpPr>
-        <p:cNvPr id="159" name="Shape 159"/>
+        <p:cNvPr id="158" name="Shape 158"/>
         <p:cNvGrpSpPr/>
         <p:nvPr/>
       </p:nvGrpSpPr>
@@ -9438,7 +9327,7 @@
       </p:grpSpPr>
       <p:sp>
         <p:nvSpPr>
-          <p:cNvPr id="160" name="Shape 160"/>
+          <p:cNvPr id="159" name="Shape 159"/>
           <p:cNvSpPr txBox="1"/>
           <p:nvPr>
             <p:ph type="title"/>
@@ -9474,7 +9363,7 @@
       </p:sp>
       <p:sp>
         <p:nvSpPr>
-          <p:cNvPr id="161" name="Shape 161"/>
+          <p:cNvPr id="160" name="Shape 160"/>
           <p:cNvSpPr txBox="1"/>
           <p:nvPr>
             <p:ph idx="1" type="body"/>
@@ -9524,7 +9413,7 @@
   <p:cSld>
     <p:spTree>
       <p:nvGrpSpPr>
-        <p:cNvPr id="165" name="Shape 165"/>
+        <p:cNvPr id="164" name="Shape 164"/>
         <p:cNvGrpSpPr/>
         <p:nvPr/>
       </p:nvGrpSpPr>
@@ -9538,7 +9427,7 @@
       </p:grpSpPr>
       <p:sp>
         <p:nvSpPr>
-          <p:cNvPr id="166" name="Shape 166"/>
+          <p:cNvPr id="165" name="Shape 165"/>
           <p:cNvSpPr txBox="1"/>
           <p:nvPr>
             <p:ph type="title"/>
@@ -9594,7 +9483,7 @@
       </p:sp>
       <p:sp>
         <p:nvSpPr>
-          <p:cNvPr id="167" name="Shape 167"/>
+          <p:cNvPr id="166" name="Shape 166"/>
           <p:cNvSpPr txBox="1"/>
           <p:nvPr>
             <p:ph idx="1" type="body"/>
@@ -9661,7 +9550,7 @@
   <p:cSld>
     <p:spTree>
       <p:nvGrpSpPr>
-        <p:cNvPr id="171" name="Shape 171"/>
+        <p:cNvPr id="170" name="Shape 170"/>
         <p:cNvGrpSpPr/>
         <p:nvPr/>
       </p:nvGrpSpPr>
@@ -9675,7 +9564,7 @@
       </p:grpSpPr>
       <p:sp>
         <p:nvSpPr>
-          <p:cNvPr id="172" name="Shape 172"/>
+          <p:cNvPr id="171" name="Shape 171"/>
           <p:cNvSpPr txBox="1"/>
           <p:nvPr>
             <p:ph type="title"/>
@@ -9786,7 +9675,7 @@
       </p:sp>
       <p:sp>
         <p:nvSpPr>
-          <p:cNvPr id="173" name="Shape 173"/>
+          <p:cNvPr id="172" name="Shape 172"/>
           <p:cNvSpPr txBox="1"/>
           <p:nvPr>
             <p:ph idx="1" type="body"/>
@@ -9839,7 +9728,7 @@
       </p:sp>
       <p:pic>
         <p:nvPicPr>
-          <p:cNvPr id="174" name="Shape 174"/>
+          <p:cNvPr id="173" name="Shape 173"/>
           <p:cNvPicPr preferRelativeResize="0"/>
           <p:nvPr/>
         </p:nvPicPr>
@@ -9910,6 +9799,41 @@
                                           </p:stCondLst>
                                         </p:cTn>
                                         <p:tgtEl>
+                                          <p:spTgt spid="171"/>
+                                        </p:tgtEl>
+                                        <p:attrNameLst>
+                                          <p:attrName>style.visibility</p:attrName>
+                                        </p:attrNameLst>
+                                      </p:cBhvr>
+                                      <p:to>
+                                        <p:strVal val="visible"/>
+                                      </p:to>
+                                    </p:set>
+                                    <p:animEffect filter="fade" transition="in">
+                                      <p:cBhvr>
+                                        <p:cTn dur="5000"/>
+                                        <p:tgtEl>
+                                          <p:spTgt spid="171"/>
+                                        </p:tgtEl>
+                                      </p:cBhvr>
+                                    </p:animEffect>
+                                  </p:childTnLst>
+                                </p:cTn>
+                              </p:par>
+                              <p:par>
+                                <p:cTn fill="hold" nodeType="withEffect" presetClass="entr" presetID="10" presetSubtype="0">
+                                  <p:stCondLst>
+                                    <p:cond delay="0"/>
+                                  </p:stCondLst>
+                                  <p:childTnLst>
+                                    <p:set>
+                                      <p:cBhvr>
+                                        <p:cTn dur="1" fill="hold">
+                                          <p:stCondLst>
+                                            <p:cond delay="0"/>
+                                          </p:stCondLst>
+                                        </p:cTn>
+                                        <p:tgtEl>
                                           <p:spTgt spid="172"/>
                                         </p:tgtEl>
                                         <p:attrNameLst>
@@ -9922,7 +9846,95 @@
                                     </p:set>
                                     <p:animEffect filter="fade" transition="in">
                                       <p:cBhvr>
-                                        <p:cTn dur="5000"/>
+                                        <p:cTn dur="1000"/>
+                                        <p:tgtEl>
+                                          <p:spTgt spid="172"/>
+                                        </p:tgtEl>
+                                      </p:cBhvr>
+                                    </p:animEffect>
+                                  </p:childTnLst>
+                                </p:cTn>
+                              </p:par>
+                            </p:childTnLst>
+                          </p:cTn>
+                        </p:par>
+                        <p:par>
+                          <p:cTn fill="hold">
+                            <p:stCondLst>
+                              <p:cond delay="5000"/>
+                            </p:stCondLst>
+                            <p:childTnLst>
+                              <p:par>
+                                <p:cTn fill="hold" nodeType="afterEffect" presetClass="exit" presetID="10" presetSubtype="0">
+                                  <p:stCondLst>
+                                    <p:cond delay="0"/>
+                                  </p:stCondLst>
+                                  <p:childTnLst>
+                                    <p:animEffect filter="fade" transition="out">
+                                      <p:cBhvr>
+                                        <p:cTn dur="1000"/>
+                                        <p:tgtEl>
+                                          <p:spTgt spid="172"/>
+                                        </p:tgtEl>
+                                      </p:cBhvr>
+                                    </p:animEffect>
+                                    <p:set>
+                                      <p:cBhvr>
+                                        <p:cTn dur="1" fill="hold">
+                                          <p:stCondLst>
+                                            <p:cond delay="1000"/>
+                                          </p:stCondLst>
+                                        </p:cTn>
+                                        <p:tgtEl>
+                                          <p:spTgt spid="172"/>
+                                        </p:tgtEl>
+                                        <p:attrNameLst>
+                                          <p:attrName>style.visibility</p:attrName>
+                                        </p:attrNameLst>
+                                      </p:cBhvr>
+                                      <p:to>
+                                        <p:strVal val="hidden"/>
+                                      </p:to>
+                                    </p:set>
+                                  </p:childTnLst>
+                                </p:cTn>
+                              </p:par>
+                            </p:childTnLst>
+                          </p:cTn>
+                        </p:par>
+                        <p:par>
+                          <p:cTn fill="hold">
+                            <p:stCondLst>
+                              <p:cond delay="6000"/>
+                            </p:stCondLst>
+                            <p:childTnLst>
+                              <p:par>
+                                <p:cTn fill="hold" nodeType="afterEffect" presetClass="entr" presetID="10" presetSubtype="0">
+                                  <p:stCondLst>
+                                    <p:cond delay="0"/>
+                                  </p:stCondLst>
+                                  <p:childTnLst>
+                                    <p:set>
+                                      <p:cBhvr>
+                                        <p:cTn dur="1" fill="hold">
+                                          <p:stCondLst>
+                                            <p:cond delay="0"/>
+                                          </p:stCondLst>
+                                        </p:cTn>
+                                        <p:tgtEl>
+                                          <p:spTgt spid="172"/>
+                                        </p:tgtEl>
+                                        <p:attrNameLst>
+                                          <p:attrName>style.visibility</p:attrName>
+                                        </p:attrNameLst>
+                                      </p:cBhvr>
+                                      <p:to>
+                                        <p:strVal val="visible"/>
+                                      </p:to>
+                                    </p:set>
+                                    <p:animEffect filter="fade" transition="in">
+                                      <p:cBhvr>
+                                        <p:cTn dur="1000"/>
                                         <p:tgtEl>
                                           <p:spTgt spid="172"/>
                                         </p:tgtEl>
@@ -9969,129 +9981,6 @@
                             </p:childTnLst>
                           </p:cTn>
                         </p:par>
-                        <p:par>
-                          <p:cTn fill="hold">
-                            <p:stCondLst>
-                              <p:cond delay="5000"/>
-                            </p:stCondLst>
-                            <p:childTnLst>
-                              <p:par>
-                                <p:cTn fill="hold" nodeType="afterEffect" presetClass="exit" presetID="10" presetSubtype="0">
-                                  <p:stCondLst>
-                                    <p:cond delay="0"/>
-                                  </p:stCondLst>
-                                  <p:childTnLst>
-                                    <p:animEffect filter="fade" transition="out">
-                                      <p:cBhvr>
-                                        <p:cTn dur="1000"/>
-                                        <p:tgtEl>
-                                          <p:spTgt spid="173"/>
-                                        </p:tgtEl>
-                                      </p:cBhvr>
-                                    </p:animEffect>
-                                    <p:set>
-                                      <p:cBhvr>
-                                        <p:cTn dur="1" fill="hold">
-                                          <p:stCondLst>
-                                            <p:cond delay="1000"/>
-                                          </p:stCondLst>
-                                        </p:cTn>
-                                        <p:tgtEl>
-                                          <p:spTgt spid="173"/>
-                                        </p:tgtEl>
-                                        <p:attrNameLst>
-                                          <p:attrName>style.visibility</p:attrName>
-                                        </p:attrNameLst>
-                                      </p:cBhvr>
-                                      <p:to>
-                                        <p:strVal val="hidden"/>
-                                      </p:to>
-                                    </p:set>
-                                  </p:childTnLst>
-                                </p:cTn>
-                              </p:par>
-                            </p:childTnLst>
-                          </p:cTn>
-                        </p:par>
-                        <p:par>
-                          <p:cTn fill="hold">
-                            <p:stCondLst>
-                              <p:cond delay="6000"/>
-                            </p:stCondLst>
-                            <p:childTnLst>
-                              <p:par>
-                                <p:cTn fill="hold" nodeType="afterEffect" presetClass="entr" presetID="10" presetSubtype="0">
-                                  <p:stCondLst>
-                                    <p:cond delay="0"/>
-                                  </p:stCondLst>
-                                  <p:childTnLst>
-                                    <p:set>
-                                      <p:cBhvr>
-                                        <p:cTn dur="1" fill="hold">
-                                          <p:stCondLst>
-                                            <p:cond delay="0"/>
-                                          </p:stCondLst>
-                                        </p:cTn>
-                                        <p:tgtEl>
-                                          <p:spTgt spid="173"/>
-                                        </p:tgtEl>
-                                        <p:attrNameLst>
-                                          <p:attrName>style.visibility</p:attrName>
-                                        </p:attrNameLst>
-                                      </p:cBhvr>
-                                      <p:to>
-                                        <p:strVal val="visible"/>
-                                      </p:to>
-                                    </p:set>
-                                    <p:animEffect filter="fade" transition="in">
-                                      <p:cBhvr>
-                                        <p:cTn dur="1000"/>
-                                        <p:tgtEl>
-                                          <p:spTgt spid="173"/>
-                                        </p:tgtEl>
-                                      </p:cBhvr>
-                                    </p:animEffect>
-                                  </p:childTnLst>
-                                </p:cTn>
-                              </p:par>
-                              <p:par>
-                                <p:cTn fill="hold" nodeType="withEffect" presetClass="entr" presetID="10" presetSubtype="0">
-                                  <p:stCondLst>
-                                    <p:cond delay="0"/>
-                                  </p:stCondLst>
-                                  <p:childTnLst>
-                                    <p:set>
-                                      <p:cBhvr>
-                                        <p:cTn dur="1" fill="hold">
-                                          <p:stCondLst>
-                                            <p:cond delay="0"/>
-                                          </p:stCondLst>
-                                        </p:cTn>
-                                        <p:tgtEl>
-                                          <p:spTgt spid="174"/>
-                                        </p:tgtEl>
-                                        <p:attrNameLst>
-                                          <p:attrName>style.visibility</p:attrName>
-                                        </p:attrNameLst>
-                                      </p:cBhvr>
-                                      <p:to>
-                                        <p:strVal val="visible"/>
-                                      </p:to>
-                                    </p:set>
-                                    <p:animEffect filter="fade" transition="in">
-                                      <p:cBhvr>
-                                        <p:cTn dur="1000"/>
-                                        <p:tgtEl>
-                                          <p:spTgt spid="174"/>
-                                        </p:tgtEl>
-                                      </p:cBhvr>
-                                    </p:animEffect>
-                                  </p:childTnLst>
-                                </p:cTn>
-                              </p:par>
-                            </p:childTnLst>
-                          </p:cTn>
-                        </p:par>
                       </p:childTnLst>
                     </p:cTn>
                   </p:par>
@@ -10125,7 +10014,7 @@
   <p:cSld>
     <p:spTree>
       <p:nvGrpSpPr>
-        <p:cNvPr id="178" name="Shape 178"/>
+        <p:cNvPr id="177" name="Shape 177"/>
         <p:cNvGrpSpPr/>
         <p:nvPr/>
       </p:nvGrpSpPr>
@@ -10139,7 +10028,7 @@
       </p:grpSpPr>
       <p:sp>
         <p:nvSpPr>
-          <p:cNvPr id="179" name="Shape 179"/>
+          <p:cNvPr id="178" name="Shape 178"/>
           <p:cNvSpPr txBox="1"/>
           <p:nvPr>
             <p:ph type="title"/>
@@ -10220,7 +10109,7 @@
       </p:sp>
       <p:sp>
         <p:nvSpPr>
-          <p:cNvPr id="180" name="Shape 180"/>
+          <p:cNvPr id="179" name="Shape 179"/>
           <p:cNvSpPr txBox="1"/>
           <p:nvPr>
             <p:ph idx="1" type="body"/>
@@ -10273,7 +10162,7 @@
       </p:sp>
       <p:pic>
         <p:nvPicPr>
-          <p:cNvPr id="181" name="Shape 181"/>
+          <p:cNvPr id="180" name="Shape 180"/>
           <p:cNvPicPr preferRelativeResize="0"/>
           <p:nvPr/>
         </p:nvPicPr>
@@ -10315,7 +10204,7 @@
   <p:cSld>
     <p:spTree>
       <p:nvGrpSpPr>
-        <p:cNvPr id="185" name="Shape 185"/>
+        <p:cNvPr id="184" name="Shape 184"/>
         <p:cNvGrpSpPr/>
         <p:nvPr/>
       </p:nvGrpSpPr>
@@ -10329,7 +10218,7 @@
       </p:grpSpPr>
       <p:sp>
         <p:nvSpPr>
-          <p:cNvPr id="186" name="Shape 186"/>
+          <p:cNvPr id="185" name="Shape 185"/>
           <p:cNvSpPr txBox="1"/>
           <p:nvPr>
             <p:ph type="title"/>
@@ -10394,7 +10283,7 @@
       </p:sp>
       <p:sp>
         <p:nvSpPr>
-          <p:cNvPr id="187" name="Shape 187"/>
+          <p:cNvPr id="186" name="Shape 186"/>
           <p:cNvSpPr txBox="1"/>
           <p:nvPr>
             <p:ph idx="1" type="body"/>
@@ -10461,7 +10350,7 @@
   <p:cSld>
     <p:spTree>
       <p:nvGrpSpPr>
-        <p:cNvPr id="191" name="Shape 191"/>
+        <p:cNvPr id="190" name="Shape 190"/>
         <p:cNvGrpSpPr/>
         <p:nvPr/>
       </p:nvGrpSpPr>
@@ -10475,7 +10364,7 @@
       </p:grpSpPr>
       <p:sp>
         <p:nvSpPr>
-          <p:cNvPr id="192" name="Shape 192"/>
+          <p:cNvPr id="191" name="Shape 191"/>
           <p:cNvSpPr txBox="1"/>
           <p:nvPr>
             <p:ph type="title"/>
@@ -10531,7 +10420,7 @@
       </p:sp>
       <p:sp>
         <p:nvSpPr>
-          <p:cNvPr id="193" name="Shape 193"/>
+          <p:cNvPr id="192" name="Shape 192"/>
           <p:cNvSpPr txBox="1"/>
           <p:nvPr>
             <p:ph idx="1" type="body"/>
@@ -10598,7 +10487,7 @@
   <p:cSld>
     <p:spTree>
       <p:nvGrpSpPr>
-        <p:cNvPr id="197" name="Shape 197"/>
+        <p:cNvPr id="196" name="Shape 196"/>
         <p:cNvGrpSpPr/>
         <p:nvPr/>
       </p:nvGrpSpPr>
@@ -10612,7 +10501,7 @@
       </p:grpSpPr>
       <p:sp>
         <p:nvSpPr>
-          <p:cNvPr id="198" name="Shape 198"/>
+          <p:cNvPr id="197" name="Shape 197"/>
           <p:cNvSpPr txBox="1"/>
           <p:nvPr>
             <p:ph type="title"/>
@@ -10648,7 +10537,7 @@
       </p:sp>
       <p:sp>
         <p:nvSpPr>
-          <p:cNvPr id="199" name="Shape 199"/>
+          <p:cNvPr id="198" name="Shape 198"/>
           <p:cNvSpPr txBox="1"/>
           <p:nvPr>
             <p:ph idx="1" type="body"/>
@@ -10698,7 +10587,7 @@
   <p:cSld>
     <p:spTree>
       <p:nvGrpSpPr>
-        <p:cNvPr id="203" name="Shape 203"/>
+        <p:cNvPr id="202" name="Shape 202"/>
         <p:cNvGrpSpPr/>
         <p:nvPr/>
       </p:nvGrpSpPr>
@@ -10712,7 +10601,7 @@
       </p:grpSpPr>
       <p:sp>
         <p:nvSpPr>
-          <p:cNvPr id="204" name="Shape 204"/>
+          <p:cNvPr id="203" name="Shape 203"/>
           <p:cNvSpPr txBox="1"/>
           <p:nvPr>
             <p:ph type="title"/>
@@ -10777,7 +10666,7 @@
       </p:sp>
       <p:sp>
         <p:nvSpPr>
-          <p:cNvPr id="205" name="Shape 205"/>
+          <p:cNvPr id="204" name="Shape 204"/>
           <p:cNvSpPr txBox="1"/>
           <p:nvPr>
             <p:ph idx="1" type="body"/>
@@ -10844,7 +10733,7 @@
   <p:cSld>
     <p:spTree>
       <p:nvGrpSpPr>
-        <p:cNvPr id="209" name="Shape 209"/>
+        <p:cNvPr id="208" name="Shape 208"/>
         <p:cNvGrpSpPr/>
         <p:nvPr/>
       </p:nvGrpSpPr>
@@ -10858,7 +10747,7 @@
       </p:grpSpPr>
       <p:sp>
         <p:nvSpPr>
-          <p:cNvPr id="210" name="Shape 210"/>
+          <p:cNvPr id="209" name="Shape 209"/>
           <p:cNvSpPr txBox="1"/>
           <p:nvPr>
             <p:ph type="title"/>
@@ -10923,7 +10812,7 @@
       </p:sp>
       <p:sp>
         <p:nvSpPr>
-          <p:cNvPr id="211" name="Shape 211"/>
+          <p:cNvPr id="210" name="Shape 210"/>
           <p:cNvSpPr txBox="1"/>
           <p:nvPr>
             <p:ph idx="1" type="body"/>
@@ -11003,7 +10892,7 @@
       </p:sp>
       <p:pic>
         <p:nvPicPr>
-          <p:cNvPr id="212" name="Shape 212"/>
+          <p:cNvPr id="211" name="Shape 211"/>
           <p:cNvPicPr preferRelativeResize="0"/>
           <p:nvPr/>
         </p:nvPicPr>
@@ -11062,6 +10951,41 @@
                             <p:childTnLst>
                               <p:par>
                                 <p:cTn fill="hold" nodeType="afterEffect" presetClass="entr" presetID="10" presetSubtype="0">
+                                  <p:stCondLst>
+                                    <p:cond delay="0"/>
+                                  </p:stCondLst>
+                                  <p:childTnLst>
+                                    <p:set>
+                                      <p:cBhvr>
+                                        <p:cTn dur="1" fill="hold">
+                                          <p:stCondLst>
+                                            <p:cond delay="0"/>
+                                          </p:stCondLst>
+                                        </p:cTn>
+                                        <p:tgtEl>
+                                          <p:spTgt spid="209"/>
+                                        </p:tgtEl>
+                                        <p:attrNameLst>
+                                          <p:attrName>style.visibility</p:attrName>
+                                        </p:attrNameLst>
+                                      </p:cBhvr>
+                                      <p:to>
+                                        <p:strVal val="visible"/>
+                                      </p:to>
+                                    </p:set>
+                                    <p:animEffect filter="fade" transition="in">
+                                      <p:cBhvr>
+                                        <p:cTn dur="1000"/>
+                                        <p:tgtEl>
+                                          <p:spTgt spid="209"/>
+                                        </p:tgtEl>
+                                      </p:cBhvr>
+                                    </p:animEffect>
+                                  </p:childTnLst>
+                                </p:cTn>
+                              </p:par>
+                              <p:par>
+                                <p:cTn fill="hold" nodeType="withEffect" presetClass="entr" presetID="10" presetSubtype="0">
                                   <p:stCondLst>
                                     <p:cond delay="0"/>
                                   </p:stCondLst>
@@ -11130,41 +11054,6 @@
                                   </p:childTnLst>
                                 </p:cTn>
                               </p:par>
-                              <p:par>
-                                <p:cTn fill="hold" nodeType="withEffect" presetClass="entr" presetID="10" presetSubtype="0">
-                                  <p:stCondLst>
-                                    <p:cond delay="0"/>
-                                  </p:stCondLst>
-                                  <p:childTnLst>
-                                    <p:set>
-                                      <p:cBhvr>
-                                        <p:cTn dur="1" fill="hold">
-                                          <p:stCondLst>
-                                            <p:cond delay="0"/>
-                                          </p:stCondLst>
-                                        </p:cTn>
-                                        <p:tgtEl>
-                                          <p:spTgt spid="212"/>
-                                        </p:tgtEl>
-                                        <p:attrNameLst>
-                                          <p:attrName>style.visibility</p:attrName>
-                                        </p:attrNameLst>
-                                      </p:cBhvr>
-                                      <p:to>
-                                        <p:strVal val="visible"/>
-                                      </p:to>
-                                    </p:set>
-                                    <p:animEffect filter="fade" transition="in">
-                                      <p:cBhvr>
-                                        <p:cTn dur="1000"/>
-                                        <p:tgtEl>
-                                          <p:spTgt spid="212"/>
-                                        </p:tgtEl>
-                                      </p:cBhvr>
-                                    </p:animEffect>
-                                  </p:childTnLst>
-                                </p:cTn>
-                              </p:par>
                             </p:childTnLst>
                           </p:cTn>
                         </p:par>
@@ -11201,7 +11090,7 @@
   <p:cSld>
     <p:spTree>
       <p:nvGrpSpPr>
-        <p:cNvPr id="216" name="Shape 216"/>
+        <p:cNvPr id="215" name="Shape 215"/>
         <p:cNvGrpSpPr/>
         <p:nvPr/>
       </p:nvGrpSpPr>
@@ -11215,7 +11104,7 @@
       </p:grpSpPr>
       <p:pic>
         <p:nvPicPr>
-          <p:cNvPr id="217" name="Shape 217"/>
+          <p:cNvPr id="216" name="Shape 216"/>
           <p:cNvPicPr preferRelativeResize="0"/>
           <p:nvPr/>
         </p:nvPicPr>
@@ -11243,7 +11132,7 @@
       </p:pic>
       <p:sp>
         <p:nvSpPr>
-          <p:cNvPr id="218" name="Shape 218"/>
+          <p:cNvPr id="217" name="Shape 217"/>
           <p:cNvSpPr txBox="1"/>
           <p:nvPr>
             <p:ph type="title"/>
@@ -11324,7 +11213,7 @@
       </p:sp>
       <p:sp>
         <p:nvSpPr>
-          <p:cNvPr id="219" name="Shape 219"/>
+          <p:cNvPr id="218" name="Shape 218"/>
           <p:cNvSpPr txBox="1"/>
           <p:nvPr>
             <p:ph idx="1" type="body"/>
@@ -11418,7 +11307,7 @@
   <p:cSld>
     <p:spTree>
       <p:nvGrpSpPr>
-        <p:cNvPr id="48" name="Shape 48"/>
+        <p:cNvPr id="47" name="Shape 47"/>
         <p:cNvGrpSpPr/>
         <p:nvPr/>
       </p:nvGrpSpPr>
@@ -11432,7 +11321,7 @@
       </p:grpSpPr>
       <p:sp>
         <p:nvSpPr>
-          <p:cNvPr id="49" name="Shape 49"/>
+          <p:cNvPr id="48" name="Shape 48"/>
           <p:cNvSpPr txBox="1"/>
           <p:nvPr>
             <p:ph type="title"/>
@@ -11512,7 +11401,7 @@
       </p:sp>
       <p:sp>
         <p:nvSpPr>
-          <p:cNvPr id="50" name="Shape 50"/>
+          <p:cNvPr id="49" name="Shape 49"/>
           <p:cNvSpPr txBox="1"/>
           <p:nvPr>
             <p:ph idx="1" type="body"/>
@@ -11624,7 +11513,7 @@
   <p:cSld>
     <p:spTree>
       <p:nvGrpSpPr>
-        <p:cNvPr id="223" name="Shape 223"/>
+        <p:cNvPr id="222" name="Shape 222"/>
         <p:cNvGrpSpPr/>
         <p:nvPr/>
       </p:nvGrpSpPr>
@@ -11638,7 +11527,7 @@
       </p:grpSpPr>
       <p:sp>
         <p:nvSpPr>
-          <p:cNvPr id="224" name="Shape 224"/>
+          <p:cNvPr id="223" name="Shape 223"/>
           <p:cNvSpPr txBox="1"/>
           <p:nvPr>
             <p:ph type="title"/>
@@ -11694,7 +11583,7 @@
       </p:sp>
       <p:sp>
         <p:nvSpPr>
-          <p:cNvPr id="225" name="Shape 225"/>
+          <p:cNvPr id="224" name="Shape 224"/>
           <p:cNvSpPr txBox="1"/>
           <p:nvPr>
             <p:ph idx="1" type="body"/>
@@ -11788,7 +11677,7 @@
   <p:cSld>
     <p:spTree>
       <p:nvGrpSpPr>
-        <p:cNvPr id="229" name="Shape 229"/>
+        <p:cNvPr id="228" name="Shape 228"/>
         <p:cNvGrpSpPr/>
         <p:nvPr/>
       </p:nvGrpSpPr>
@@ -11802,7 +11691,7 @@
       </p:grpSpPr>
       <p:sp>
         <p:nvSpPr>
-          <p:cNvPr id="230" name="Shape 230"/>
+          <p:cNvPr id="229" name="Shape 229"/>
           <p:cNvSpPr txBox="1"/>
           <p:nvPr>
             <p:ph type="title"/>
@@ -11858,7 +11747,7 @@
       </p:sp>
       <p:sp>
         <p:nvSpPr>
-          <p:cNvPr id="231" name="Shape 231"/>
+          <p:cNvPr id="230" name="Shape 230"/>
           <p:cNvSpPr txBox="1"/>
           <p:nvPr>
             <p:ph idx="1" type="body"/>
@@ -11923,7 +11812,7 @@
   <p:cSld>
     <p:spTree>
       <p:nvGrpSpPr>
-        <p:cNvPr id="235" name="Shape 235"/>
+        <p:cNvPr id="234" name="Shape 234"/>
         <p:cNvGrpSpPr/>
         <p:nvPr/>
       </p:nvGrpSpPr>
@@ -11937,7 +11826,7 @@
       </p:grpSpPr>
       <p:sp>
         <p:nvSpPr>
-          <p:cNvPr id="236" name="Shape 236"/>
+          <p:cNvPr id="235" name="Shape 235"/>
           <p:cNvSpPr txBox="1"/>
           <p:nvPr>
             <p:ph type="title"/>
@@ -11973,7 +11862,7 @@
       </p:sp>
       <p:sp>
         <p:nvSpPr>
-          <p:cNvPr id="237" name="Shape 237"/>
+          <p:cNvPr id="236" name="Shape 236"/>
           <p:cNvSpPr txBox="1"/>
           <p:nvPr>
             <p:ph idx="1" type="body"/>
@@ -12023,7 +11912,7 @@
   <p:cSld>
     <p:spTree>
       <p:nvGrpSpPr>
-        <p:cNvPr id="241" name="Shape 241"/>
+        <p:cNvPr id="240" name="Shape 240"/>
         <p:cNvGrpSpPr/>
         <p:nvPr/>
       </p:nvGrpSpPr>
@@ -12037,7 +11926,7 @@
       </p:grpSpPr>
       <p:sp>
         <p:nvSpPr>
-          <p:cNvPr id="242" name="Shape 242"/>
+          <p:cNvPr id="241" name="Shape 241"/>
           <p:cNvSpPr txBox="1"/>
           <p:nvPr>
             <p:ph type="title"/>
@@ -12102,7 +11991,7 @@
       </p:sp>
       <p:sp>
         <p:nvSpPr>
-          <p:cNvPr id="243" name="Shape 243"/>
+          <p:cNvPr id="242" name="Shape 242"/>
           <p:cNvSpPr txBox="1"/>
           <p:nvPr>
             <p:ph idx="1" type="body"/>
@@ -12169,7 +12058,7 @@
   <p:cSld>
     <p:spTree>
       <p:nvGrpSpPr>
-        <p:cNvPr id="247" name="Shape 247"/>
+        <p:cNvPr id="246" name="Shape 246"/>
         <p:cNvGrpSpPr/>
         <p:nvPr/>
       </p:nvGrpSpPr>
@@ -12183,7 +12072,7 @@
       </p:grpSpPr>
       <p:sp>
         <p:nvSpPr>
-          <p:cNvPr id="248" name="Shape 248"/>
+          <p:cNvPr id="247" name="Shape 247"/>
           <p:cNvSpPr txBox="1"/>
           <p:nvPr>
             <p:ph type="title"/>
@@ -12248,7 +12137,7 @@
       </p:sp>
       <p:sp>
         <p:nvSpPr>
-          <p:cNvPr id="249" name="Shape 249"/>
+          <p:cNvPr id="248" name="Shape 248"/>
           <p:cNvSpPr txBox="1"/>
           <p:nvPr>
             <p:ph idx="1" type="body"/>
@@ -12328,7 +12217,7 @@
       </p:sp>
       <p:pic>
         <p:nvPicPr>
-          <p:cNvPr id="250" name="Shape 250"/>
+          <p:cNvPr id="249" name="Shape 249"/>
           <p:cNvPicPr preferRelativeResize="0"/>
           <p:nvPr/>
         </p:nvPicPr>
@@ -12387,6 +12276,56 @@
                             <p:childTnLst>
                               <p:par>
                                 <p:cTn fill="hold" nodeType="afterEffect" presetClass="entr" presetID="2" presetSubtype="8">
+                                  <p:stCondLst>
+                                    <p:cond delay="0"/>
+                                  </p:stCondLst>
+                                  <p:childTnLst>
+                                    <p:set>
+                                      <p:cBhvr>
+                                        <p:cTn dur="1" fill="hold">
+                                          <p:stCondLst>
+                                            <p:cond delay="0"/>
+                                          </p:stCondLst>
+                                        </p:cTn>
+                                        <p:tgtEl>
+                                          <p:spTgt spid="247"/>
+                                        </p:tgtEl>
+                                        <p:attrNameLst>
+                                          <p:attrName>style.visibility</p:attrName>
+                                        </p:attrNameLst>
+                                      </p:cBhvr>
+                                      <p:to>
+                                        <p:strVal val="visible"/>
+                                      </p:to>
+                                    </p:set>
+                                    <p:anim calcmode="lin" valueType="num">
+                                      <p:cBhvr additive="base">
+                                        <p:cTn dur="1000"/>
+                                        <p:tgtEl>
+                                          <p:spTgt spid="247"/>
+                                        </p:tgtEl>
+                                        <p:attrNameLst>
+                                          <p:attrName>ppt_x</p:attrName>
+                                        </p:attrNameLst>
+                                      </p:cBhvr>
+                                      <p:tavLst>
+                                        <p:tav fmla="" tm="0">
+                                          <p:val>
+                                            <p:strVal val="#ppt_x-1"/>
+                                          </p:val>
+                                        </p:tav>
+                                        <p:tav fmla="" tm="100000">
+                                          <p:val>
+                                            <p:strVal val="#ppt_x"/>
+                                          </p:val>
+                                        </p:tav>
+                                      </p:tavLst>
+                                    </p:anim>
+                                  </p:childTnLst>
+                                </p:cTn>
+                              </p:par>
+                              <p:par>
+                                <p:cTn fill="hold" nodeType="withEffect" presetClass="entr" presetID="2" presetSubtype="8">
                                   <p:stCondLst>
                                     <p:cond delay="0"/>
                                   </p:stCondLst>
@@ -12435,8 +12374,17 @@
                                   </p:childTnLst>
                                 </p:cTn>
                               </p:par>
+                            </p:childTnLst>
+                          </p:cTn>
+                        </p:par>
+                        <p:par>
+                          <p:cTn fill="hold">
+                            <p:stCondLst>
+                              <p:cond delay="1000"/>
+                            </p:stCondLst>
+                            <p:childTnLst>
                               <p:par>
-                                <p:cTn fill="hold" nodeType="withEffect" presetClass="entr" presetID="2" presetSubtype="8">
+                                <p:cTn fill="hold" nodeType="afterEffect" presetClass="entr" presetID="2" presetSubtype="8">
                                   <p:stCondLst>
                                     <p:cond delay="0"/>
                                   </p:stCondLst>
@@ -12464,65 +12412,6 @@
                                         <p:cTn dur="1000"/>
                                         <p:tgtEl>
                                           <p:spTgt spid="249"/>
-                                        </p:tgtEl>
-                                        <p:attrNameLst>
-                                          <p:attrName>ppt_x</p:attrName>
-                                        </p:attrNameLst>
-                                      </p:cBhvr>
-                                      <p:tavLst>
-                                        <p:tav fmla="" tm="0">
-                                          <p:val>
-                                            <p:strVal val="#ppt_x-1"/>
-                                          </p:val>
-                                        </p:tav>
-                                        <p:tav fmla="" tm="100000">
-                                          <p:val>
-                                            <p:strVal val="#ppt_x"/>
-                                          </p:val>
-                                        </p:tav>
-                                      </p:tavLst>
-                                    </p:anim>
-                                  </p:childTnLst>
-                                </p:cTn>
-                              </p:par>
-                            </p:childTnLst>
-                          </p:cTn>
-                        </p:par>
-                        <p:par>
-                          <p:cTn fill="hold">
-                            <p:stCondLst>
-                              <p:cond delay="1000"/>
-                            </p:stCondLst>
-                            <p:childTnLst>
-                              <p:par>
-                                <p:cTn fill="hold" nodeType="afterEffect" presetClass="entr" presetID="2" presetSubtype="8">
-                                  <p:stCondLst>
-                                    <p:cond delay="0"/>
-                                  </p:stCondLst>
-                                  <p:childTnLst>
-                                    <p:set>
-                                      <p:cBhvr>
-                                        <p:cTn dur="1" fill="hold">
-                                          <p:stCondLst>
-                                            <p:cond delay="0"/>
-                                          </p:stCondLst>
-                                        </p:cTn>
-                                        <p:tgtEl>
-                                          <p:spTgt spid="250"/>
-                                        </p:tgtEl>
-                                        <p:attrNameLst>
-                                          <p:attrName>style.visibility</p:attrName>
-                                        </p:attrNameLst>
-                                      </p:cBhvr>
-                                      <p:to>
-                                        <p:strVal val="visible"/>
-                                      </p:to>
-                                    </p:set>
-                                    <p:anim calcmode="lin" valueType="num">
-                                      <p:cBhvr additive="base">
-                                        <p:cTn dur="1000"/>
-                                        <p:tgtEl>
-                                          <p:spTgt spid="250"/>
                                         </p:tgtEl>
                                         <p:attrNameLst>
                                           <p:attrName>ppt_x</p:attrName>
@@ -12580,7 +12469,7 @@
   <p:cSld>
     <p:spTree>
       <p:nvGrpSpPr>
-        <p:cNvPr id="254" name="Shape 254"/>
+        <p:cNvPr id="253" name="Shape 253"/>
         <p:cNvGrpSpPr/>
         <p:nvPr/>
       </p:nvGrpSpPr>
@@ -12594,7 +12483,7 @@
       </p:grpSpPr>
       <p:pic>
         <p:nvPicPr>
-          <p:cNvPr id="255" name="Shape 255"/>
+          <p:cNvPr id="254" name="Shape 254"/>
           <p:cNvPicPr preferRelativeResize="0"/>
           <p:nvPr/>
         </p:nvPicPr>
@@ -12622,7 +12511,7 @@
       </p:pic>
       <p:sp>
         <p:nvSpPr>
-          <p:cNvPr id="256" name="Shape 256"/>
+          <p:cNvPr id="255" name="Shape 255"/>
           <p:cNvSpPr txBox="1"/>
           <p:nvPr>
             <p:ph type="title"/>
@@ -12706,7 +12595,7 @@
       </p:sp>
       <p:sp>
         <p:nvSpPr>
-          <p:cNvPr id="257" name="Shape 257"/>
+          <p:cNvPr id="256" name="Shape 256"/>
           <p:cNvSpPr txBox="1"/>
           <p:nvPr>
             <p:ph idx="1" type="body"/>
@@ -12773,7 +12662,7 @@
   <p:cSld>
     <p:spTree>
       <p:nvGrpSpPr>
-        <p:cNvPr id="261" name="Shape 261"/>
+        <p:cNvPr id="260" name="Shape 260"/>
         <p:cNvGrpSpPr/>
         <p:nvPr/>
       </p:nvGrpSpPr>
@@ -12787,7 +12676,7 @@
       </p:grpSpPr>
       <p:sp>
         <p:nvSpPr>
-          <p:cNvPr id="262" name="Shape 262"/>
+          <p:cNvPr id="261" name="Shape 261"/>
           <p:cNvSpPr txBox="1"/>
           <p:nvPr>
             <p:ph type="title"/>
@@ -12843,7 +12732,7 @@
       </p:sp>
       <p:sp>
         <p:nvSpPr>
-          <p:cNvPr id="263" name="Shape 263"/>
+          <p:cNvPr id="262" name="Shape 262"/>
           <p:cNvSpPr txBox="1"/>
           <p:nvPr>
             <p:ph idx="1" type="body"/>
@@ -12923,7 +12812,7 @@
       </p:sp>
       <p:pic>
         <p:nvPicPr>
-          <p:cNvPr id="264" name="Shape 264"/>
+          <p:cNvPr id="263" name="Shape 263"/>
           <p:cNvPicPr preferRelativeResize="0"/>
           <p:nvPr/>
         </p:nvPicPr>
@@ -12965,7 +12854,7 @@
   <p:cSld>
     <p:spTree>
       <p:nvGrpSpPr>
-        <p:cNvPr id="268" name="Shape 268"/>
+        <p:cNvPr id="267" name="Shape 267"/>
         <p:cNvGrpSpPr/>
         <p:nvPr/>
       </p:nvGrpSpPr>
@@ -12979,7 +12868,7 @@
       </p:grpSpPr>
       <p:sp>
         <p:nvSpPr>
-          <p:cNvPr id="269" name="Shape 269"/>
+          <p:cNvPr id="268" name="Shape 268"/>
           <p:cNvSpPr txBox="1"/>
           <p:nvPr>
             <p:ph type="title"/>
@@ -13035,7 +12924,7 @@
       </p:sp>
       <p:sp>
         <p:nvSpPr>
-          <p:cNvPr id="270" name="Shape 270"/>
+          <p:cNvPr id="269" name="Shape 269"/>
           <p:cNvSpPr txBox="1"/>
           <p:nvPr>
             <p:ph idx="1" type="body"/>
@@ -13102,7 +12991,7 @@
   <p:cSld>
     <p:spTree>
       <p:nvGrpSpPr>
-        <p:cNvPr id="274" name="Shape 274"/>
+        <p:cNvPr id="273" name="Shape 273"/>
         <p:cNvGrpSpPr/>
         <p:nvPr/>
       </p:nvGrpSpPr>
@@ -13116,7 +13005,7 @@
       </p:grpSpPr>
       <p:pic>
         <p:nvPicPr>
-          <p:cNvPr id="275" name="Shape 275"/>
+          <p:cNvPr id="274" name="Shape 274"/>
           <p:cNvPicPr preferRelativeResize="0"/>
           <p:nvPr/>
         </p:nvPicPr>
@@ -13144,7 +13033,7 @@
       </p:pic>
       <p:sp>
         <p:nvSpPr>
-          <p:cNvPr id="276" name="Shape 276"/>
+          <p:cNvPr id="275" name="Shape 275"/>
           <p:cNvSpPr txBox="1"/>
           <p:nvPr/>
         </p:nvSpPr>
@@ -13186,7 +13075,7 @@
       </p:sp>
       <p:sp>
         <p:nvSpPr>
-          <p:cNvPr id="277" name="Shape 277"/>
+          <p:cNvPr id="276" name="Shape 276"/>
           <p:cNvSpPr txBox="1"/>
           <p:nvPr>
             <p:ph type="ctrTitle"/>
@@ -13222,7 +13111,7 @@
       </p:sp>
       <p:pic>
         <p:nvPicPr>
-          <p:cNvPr id="278" name="Shape 278"/>
+          <p:cNvPr id="277" name="Shape 277"/>
           <p:cNvPicPr preferRelativeResize="0"/>
           <p:nvPr/>
         </p:nvPicPr>
@@ -13293,7 +13182,7 @@
                                           </p:stCondLst>
                                         </p:cTn>
                                         <p:tgtEl>
-                                          <p:spTgt spid="276"/>
+                                          <p:spTgt spid="275"/>
                                         </p:tgtEl>
                                         <p:attrNameLst>
                                           <p:attrName>style.visibility</p:attrName>
@@ -13307,7 +13196,7 @@
                                       <p:cBhvr>
                                         <p:cTn dur="2000"/>
                                         <p:tgtEl>
-                                          <p:spTgt spid="276"/>
+                                          <p:spTgt spid="275"/>
                                         </p:tgtEl>
                                       </p:cBhvr>
                                     </p:animEffect>
@@ -13337,7 +13226,7 @@
                                           </p:stCondLst>
                                         </p:cTn>
                                         <p:tgtEl>
-                                          <p:spTgt spid="275"/>
+                                          <p:spTgt spid="274"/>
                                         </p:tgtEl>
                                         <p:attrNameLst>
                                           <p:attrName>style.visibility</p:attrName>
@@ -13351,7 +13240,7 @@
                                       <p:cBhvr>
                                         <p:cTn dur="5000"/>
                                         <p:tgtEl>
-                                          <p:spTgt spid="275"/>
+                                          <p:spTgt spid="274"/>
                                         </p:tgtEl>
                                       </p:cBhvr>
                                     </p:animEffect>
@@ -13372,7 +13261,7 @@
                                           </p:stCondLst>
                                         </p:cTn>
                                         <p:tgtEl>
-                                          <p:spTgt spid="278"/>
+                                          <p:spTgt spid="277"/>
                                         </p:tgtEl>
                                         <p:attrNameLst>
                                           <p:attrName>style.visibility</p:attrName>
@@ -13386,7 +13275,7 @@
                                       <p:cBhvr additive="base">
                                         <p:cTn dur="5000"/>
                                         <p:tgtEl>
-                                          <p:spTgt spid="278"/>
+                                          <p:spTgt spid="277"/>
                                         </p:tgtEl>
                                         <p:attrNameLst>
                                           <p:attrName>ppt_x</p:attrName>
@@ -13427,7 +13316,7 @@
                                       <p:cBhvr>
                                         <p:cTn dur="2500"/>
                                         <p:tgtEl>
-                                          <p:spTgt spid="276"/>
+                                          <p:spTgt spid="275"/>
                                         </p:tgtEl>
                                       </p:cBhvr>
                                     </p:animEffect>
@@ -13439,7 +13328,7 @@
                                           </p:stCondLst>
                                         </p:cTn>
                                         <p:tgtEl>
-                                          <p:spTgt spid="276"/>
+                                          <p:spTgt spid="275"/>
                                         </p:tgtEl>
                                         <p:attrNameLst>
                                           <p:attrName>style.visibility</p:attrName>
@@ -13471,7 +13360,7 @@
                                       <p:cBhvr additive="base">
                                         <p:cTn dur="5000"/>
                                         <p:tgtEl>
-                                          <p:spTgt spid="278"/>
+                                          <p:spTgt spid="277"/>
                                         </p:tgtEl>
                                         <p:attrNameLst>
                                           <p:attrName>ppt_x</p:attrName>
@@ -13498,7 +13387,7 @@
                                           </p:stCondLst>
                                         </p:cTn>
                                         <p:tgtEl>
-                                          <p:spTgt spid="278"/>
+                                          <p:spTgt spid="277"/>
                                         </p:tgtEl>
                                         <p:attrNameLst>
                                           <p:attrName>style.visibility</p:attrName>
@@ -13547,7 +13436,7 @@
   <p:cSld>
     <p:spTree>
       <p:nvGrpSpPr>
-        <p:cNvPr id="54" name="Shape 54"/>
+        <p:cNvPr id="53" name="Shape 53"/>
         <p:cNvGrpSpPr/>
         <p:nvPr/>
       </p:nvGrpSpPr>
@@ -13561,7 +13450,7 @@
       </p:grpSpPr>
       <p:pic>
         <p:nvPicPr>
-          <p:cNvPr id="55" name="Shape 55"/>
+          <p:cNvPr id="54" name="Shape 54"/>
           <p:cNvPicPr preferRelativeResize="0"/>
           <p:nvPr/>
         </p:nvPicPr>
@@ -13589,7 +13478,7 @@
       </p:pic>
       <p:sp>
         <p:nvSpPr>
-          <p:cNvPr id="56" name="Shape 56"/>
+          <p:cNvPr id="55" name="Shape 55"/>
           <p:cNvSpPr txBox="1"/>
           <p:nvPr>
             <p:ph type="title"/>
@@ -13645,7 +13534,7 @@
       </p:sp>
       <p:sp>
         <p:nvSpPr>
-          <p:cNvPr id="57" name="Shape 57"/>
+          <p:cNvPr id="56" name="Shape 56"/>
           <p:cNvSpPr txBox="1"/>
           <p:nvPr>
             <p:ph idx="1" type="body"/>
@@ -13732,6 +13621,56 @@
                             <p:childTnLst>
                               <p:par>
                                 <p:cTn fill="hold" nodeType="afterEffect" presetClass="entr" presetID="2" presetSubtype="8">
+                                  <p:stCondLst>
+                                    <p:cond delay="0"/>
+                                  </p:stCondLst>
+                                  <p:childTnLst>
+                                    <p:set>
+                                      <p:cBhvr>
+                                        <p:cTn dur="1" fill="hold">
+                                          <p:stCondLst>
+                                            <p:cond delay="0"/>
+                                          </p:stCondLst>
+                                        </p:cTn>
+                                        <p:tgtEl>
+                                          <p:spTgt spid="55"/>
+                                        </p:tgtEl>
+                                        <p:attrNameLst>
+                                          <p:attrName>style.visibility</p:attrName>
+                                        </p:attrNameLst>
+                                      </p:cBhvr>
+                                      <p:to>
+                                        <p:strVal val="visible"/>
+                                      </p:to>
+                                    </p:set>
+                                    <p:anim calcmode="lin" valueType="num">
+                                      <p:cBhvr additive="base">
+                                        <p:cTn dur="1000"/>
+                                        <p:tgtEl>
+                                          <p:spTgt spid="55"/>
+                                        </p:tgtEl>
+                                        <p:attrNameLst>
+                                          <p:attrName>ppt_x</p:attrName>
+                                        </p:attrNameLst>
+                                      </p:cBhvr>
+                                      <p:tavLst>
+                                        <p:tav fmla="" tm="0">
+                                          <p:val>
+                                            <p:strVal val="#ppt_x-1"/>
+                                          </p:val>
+                                        </p:tav>
+                                        <p:tav fmla="" tm="100000">
+                                          <p:val>
+                                            <p:strVal val="#ppt_x"/>
+                                          </p:val>
+                                        </p:tav>
+                                      </p:tavLst>
+                                    </p:anim>
+                                  </p:childTnLst>
+                                </p:cTn>
+                              </p:par>
+                              <p:par>
+                                <p:cTn fill="hold" nodeType="withEffect" presetClass="entr" presetID="2" presetSubtype="8">
                                   <p:stCondLst>
                                     <p:cond delay="0"/>
                                   </p:stCondLst>
@@ -13780,56 +13719,6 @@
                                   </p:childTnLst>
                                 </p:cTn>
                               </p:par>
-                              <p:par>
-                                <p:cTn fill="hold" nodeType="withEffect" presetClass="entr" presetID="2" presetSubtype="8">
-                                  <p:stCondLst>
-                                    <p:cond delay="0"/>
-                                  </p:stCondLst>
-                                  <p:childTnLst>
-                                    <p:set>
-                                      <p:cBhvr>
-                                        <p:cTn dur="1" fill="hold">
-                                          <p:stCondLst>
-                                            <p:cond delay="0"/>
-                                          </p:stCondLst>
-                                        </p:cTn>
-                                        <p:tgtEl>
-                                          <p:spTgt spid="57"/>
-                                        </p:tgtEl>
-                                        <p:attrNameLst>
-                                          <p:attrName>style.visibility</p:attrName>
-                                        </p:attrNameLst>
-                                      </p:cBhvr>
-                                      <p:to>
-                                        <p:strVal val="visible"/>
-                                      </p:to>
-                                    </p:set>
-                                    <p:anim calcmode="lin" valueType="num">
-                                      <p:cBhvr additive="base">
-                                        <p:cTn dur="1000"/>
-                                        <p:tgtEl>
-                                          <p:spTgt spid="57"/>
-                                        </p:tgtEl>
-                                        <p:attrNameLst>
-                                          <p:attrName>ppt_x</p:attrName>
-                                        </p:attrNameLst>
-                                      </p:cBhvr>
-                                      <p:tavLst>
-                                        <p:tav fmla="" tm="0">
-                                          <p:val>
-                                            <p:strVal val="#ppt_x-1"/>
-                                          </p:val>
-                                        </p:tav>
-                                        <p:tav fmla="" tm="100000">
-                                          <p:val>
-                                            <p:strVal val="#ppt_x"/>
-                                          </p:val>
-                                        </p:tav>
-                                      </p:tavLst>
-                                    </p:anim>
-                                  </p:childTnLst>
-                                </p:cTn>
-                              </p:par>
                             </p:childTnLst>
                           </p:cTn>
                         </p:par>
@@ -13853,7 +13742,7 @@
                                           </p:stCondLst>
                                         </p:cTn>
                                         <p:tgtEl>
-                                          <p:spTgt spid="55"/>
+                                          <p:spTgt spid="54"/>
                                         </p:tgtEl>
                                         <p:attrNameLst>
                                           <p:attrName>style.visibility</p:attrName>
@@ -13867,7 +13756,7 @@
                                       <p:cBhvr additive="base">
                                         <p:cTn dur="1000"/>
                                         <p:tgtEl>
-                                          <p:spTgt spid="55"/>
+                                          <p:spTgt spid="54"/>
                                         </p:tgtEl>
                                         <p:attrNameLst>
                                           <p:attrName>ppt_x</p:attrName>
@@ -13925,7 +13814,7 @@
   <p:cSld>
     <p:spTree>
       <p:nvGrpSpPr>
-        <p:cNvPr id="61" name="Shape 61"/>
+        <p:cNvPr id="60" name="Shape 60"/>
         <p:cNvGrpSpPr/>
         <p:nvPr/>
       </p:nvGrpSpPr>
@@ -13939,7 +13828,7 @@
       </p:grpSpPr>
       <p:sp>
         <p:nvSpPr>
-          <p:cNvPr id="62" name="Shape 62"/>
+          <p:cNvPr id="61" name="Shape 61"/>
           <p:cNvSpPr txBox="1"/>
           <p:nvPr>
             <p:ph type="title"/>
@@ -14032,7 +13921,7 @@
       </p:sp>
       <p:sp>
         <p:nvSpPr>
-          <p:cNvPr id="63" name="Shape 63"/>
+          <p:cNvPr id="62" name="Shape 62"/>
           <p:cNvSpPr txBox="1"/>
           <p:nvPr>
             <p:ph idx="1" type="body"/>
@@ -14085,7 +13974,7 @@
       </p:sp>
       <p:pic>
         <p:nvPicPr>
-          <p:cNvPr id="64" name="Shape 64"/>
+          <p:cNvPr id="63" name="Shape 63"/>
           <p:cNvPicPr preferRelativeResize="0"/>
           <p:nvPr/>
         </p:nvPicPr>
@@ -14127,7 +14016,7 @@
   <p:cSld>
     <p:spTree>
       <p:nvGrpSpPr>
-        <p:cNvPr id="68" name="Shape 68"/>
+        <p:cNvPr id="67" name="Shape 67"/>
         <p:cNvGrpSpPr/>
         <p:nvPr/>
       </p:nvGrpSpPr>
@@ -14141,7 +14030,7 @@
       </p:grpSpPr>
       <p:sp>
         <p:nvSpPr>
-          <p:cNvPr id="69" name="Shape 69"/>
+          <p:cNvPr id="68" name="Shape 68"/>
           <p:cNvSpPr txBox="1"/>
           <p:nvPr>
             <p:ph type="title"/>
@@ -14206,7 +14095,7 @@
       </p:sp>
       <p:sp>
         <p:nvSpPr>
-          <p:cNvPr id="70" name="Shape 70"/>
+          <p:cNvPr id="69" name="Shape 69"/>
           <p:cNvSpPr txBox="1"/>
           <p:nvPr>
             <p:ph idx="1" type="body"/>
@@ -14285,7 +14174,7 @@
   <p:cSld>
     <p:spTree>
       <p:nvGrpSpPr>
-        <p:cNvPr id="74" name="Shape 74"/>
+        <p:cNvPr id="73" name="Shape 73"/>
         <p:cNvGrpSpPr/>
         <p:nvPr/>
       </p:nvGrpSpPr>
@@ -14299,7 +14188,7 @@
       </p:grpSpPr>
       <p:sp>
         <p:nvSpPr>
-          <p:cNvPr id="75" name="Shape 75"/>
+          <p:cNvPr id="74" name="Shape 74"/>
           <p:cNvSpPr txBox="1"/>
           <p:nvPr>
             <p:ph type="title"/>
@@ -14364,7 +14253,7 @@
       </p:sp>
       <p:sp>
         <p:nvSpPr>
-          <p:cNvPr id="76" name="Shape 76"/>
+          <p:cNvPr id="75" name="Shape 75"/>
           <p:cNvSpPr txBox="1"/>
           <p:nvPr>
             <p:ph idx="1" type="body"/>
@@ -14431,7 +14320,7 @@
   <p:cSld>
     <p:spTree>
       <p:nvGrpSpPr>
-        <p:cNvPr id="80" name="Shape 80"/>
+        <p:cNvPr id="79" name="Shape 79"/>
         <p:cNvGrpSpPr/>
         <p:nvPr/>
       </p:nvGrpSpPr>
@@ -14445,7 +14334,7 @@
       </p:grpSpPr>
       <p:sp>
         <p:nvSpPr>
-          <p:cNvPr id="81" name="Shape 81"/>
+          <p:cNvPr id="80" name="Shape 80"/>
           <p:cNvSpPr txBox="1"/>
           <p:nvPr>
             <p:ph type="title"/>
@@ -14481,7 +14370,7 @@
       </p:sp>
       <p:sp>
         <p:nvSpPr>
-          <p:cNvPr id="82" name="Shape 82"/>
+          <p:cNvPr id="81" name="Shape 81"/>
           <p:cNvSpPr txBox="1"/>
           <p:nvPr>
             <p:ph idx="1" type="body"/>
@@ -14517,7 +14406,7 @@
       </p:sp>
       <p:pic>
         <p:nvPicPr>
-          <p:cNvPr id="83" name="Shape 83"/>
+          <p:cNvPr id="82" name="Shape 82"/>
           <p:cNvPicPr preferRelativeResize="0"/>
           <p:nvPr/>
         </p:nvPicPr>
@@ -14588,7 +14477,7 @@
                                           </p:stCondLst>
                                         </p:cTn>
                                         <p:tgtEl>
-                                          <p:spTgt spid="83"/>
+                                          <p:spTgt spid="82"/>
                                         </p:tgtEl>
                                         <p:attrNameLst>
                                           <p:attrName>style.visibility</p:attrName>
@@ -14602,7 +14491,7 @@
                                       <p:cBhvr>
                                         <p:cTn dur="1000"/>
                                         <p:tgtEl>
-                                          <p:spTgt spid="83"/>
+                                          <p:spTgt spid="82"/>
                                         </p:tgtEl>
                                       </p:cBhvr>
                                     </p:animEffect>
@@ -14645,7 +14534,7 @@
   <p:cSld>
     <p:spTree>
       <p:nvGrpSpPr>
-        <p:cNvPr id="87" name="Shape 87"/>
+        <p:cNvPr id="86" name="Shape 86"/>
         <p:cNvGrpSpPr/>
         <p:nvPr/>
       </p:nvGrpSpPr>
@@ -14659,7 +14548,7 @@
       </p:grpSpPr>
       <p:sp>
         <p:nvSpPr>
-          <p:cNvPr id="88" name="Shape 88"/>
+          <p:cNvPr id="87" name="Shape 87"/>
           <p:cNvSpPr txBox="1"/>
           <p:nvPr>
             <p:ph type="title"/>
@@ -14715,7 +14604,7 @@
       </p:sp>
       <p:sp>
         <p:nvSpPr>
-          <p:cNvPr id="89" name="Shape 89"/>
+          <p:cNvPr id="88" name="Shape 88"/>
           <p:cNvSpPr txBox="1"/>
           <p:nvPr>
             <p:ph idx="1" type="body"/>
@@ -14778,6 +14667,283 @@
 </file>
 
 <file path=ppt/theme/theme1.xml><?xml version="1.0" encoding="utf-8"?>
+<a:theme xmlns:a="http://schemas.openxmlformats.org/drawingml/2006/main" xmlns:r="http://schemas.openxmlformats.org/officeDocument/2006/relationships" name="simple-light">
+  <a:themeElements>
+    <a:clrScheme name="Custom 347">
+      <a:dk1>
+        <a:srgbClr val="000000"/>
+      </a:dk1>
+      <a:lt1>
+        <a:srgbClr val="FFFFFF"/>
+      </a:lt1>
+      <a:dk2>
+        <a:srgbClr val="666666"/>
+      </a:dk2>
+      <a:lt2>
+        <a:srgbClr val="CCCCCC"/>
+      </a:lt2>
+      <a:accent1>
+        <a:srgbClr val="3A81BA"/>
+      </a:accent1>
+      <a:accent2>
+        <a:srgbClr val="D89F39"/>
+      </a:accent2>
+      <a:accent3>
+        <a:srgbClr val="8BAB42"/>
+      </a:accent3>
+      <a:accent4>
+        <a:srgbClr val="57A7B5"/>
+      </a:accent4>
+      <a:accent5>
+        <a:srgbClr val="8B81D2"/>
+      </a:accent5>
+      <a:accent6>
+        <a:srgbClr val="963334"/>
+      </a:accent6>
+      <a:hlink>
+        <a:srgbClr val="1155CC"/>
+      </a:hlink>
+      <a:folHlink>
+        <a:srgbClr val="6611CC"/>
+      </a:folHlink>
+    </a:clrScheme>
+    <a:fontScheme name="Office">
+      <a:majorFont>
+        <a:latin typeface="Arial"/>
+        <a:ea typeface=""/>
+        <a:cs typeface=""/>
+        <a:font script="Jpan" typeface="ＭＳ Ｐゴシック"/>
+        <a:font script="Hang" typeface="맑은 고딕"/>
+        <a:font script="Hans" typeface="宋体"/>
+        <a:font script="Hant" typeface="新細明體"/>
+        <a:font script="Arab" typeface="Times New Roman"/>
+        <a:font script="Hebr" typeface="Times New Roman"/>
+        <a:font script="Thai" typeface="Angsana New"/>
+        <a:font script="Ethi" typeface="Nyala"/>
+        <a:font script="Beng" typeface="Vrinda"/>
+        <a:font script="Gujr" typeface="Shruti"/>
+        <a:font script="Khmr" typeface="MoolBoran"/>
+        <a:font script="Knda" typeface="Tunga"/>
+        <a:font script="Guru" typeface="Raavi"/>
+        <a:font script="Cans" typeface="Euphemia"/>
+        <a:font script="Cher" typeface="Plantagenet Cherokee"/>
+        <a:font script="Yiii" typeface="Microsoft Yi Baiti"/>
+        <a:font script="Tibt" typeface="Microsoft Himalaya"/>
+        <a:font script="Thaa" typeface="MV Boli"/>
+        <a:font script="Deva" typeface="Mangal"/>
+        <a:font script="Telu" typeface="Gautami"/>
+        <a:font script="Taml" typeface="Latha"/>
+        <a:font script="Syrc" typeface="Estrangelo Edessa"/>
+        <a:font script="Orya" typeface="Kalinga"/>
+        <a:font script="Mlym" typeface="Kartika"/>
+        <a:font script="Laoo" typeface="DokChampa"/>
+        <a:font script="Sinh" typeface="Iskoola Pota"/>
+        <a:font script="Mong" typeface="Mongolian Baiti"/>
+        <a:font script="Viet" typeface="Times New Roman"/>
+        <a:font script="Uigh" typeface="Microsoft Uighur"/>
+      </a:majorFont>
+      <a:minorFont>
+        <a:latin typeface="Arial"/>
+        <a:ea typeface=""/>
+        <a:cs typeface=""/>
+        <a:font script="Jpan" typeface="ＭＳ Ｐゴシック"/>
+        <a:font script="Hang" typeface="맑은 고딕"/>
+        <a:font script="Hans" typeface="宋体"/>
+        <a:font script="Hant" typeface="新細明體"/>
+        <a:font script="Arab" typeface="Times New Roman"/>
+        <a:font script="Hebr" typeface="Times New Roman"/>
+        <a:font script="Thai" typeface="Angsana New"/>
+        <a:font script="Ethi" typeface="Nyala"/>
+        <a:font script="Beng" typeface="Vrinda"/>
+        <a:font script="Gujr" typeface="Shruti"/>
+        <a:font script="Khmr" typeface="MoolBoran"/>
+        <a:font script="Knda" typeface="Tunga"/>
+        <a:font script="Guru" typeface="Raavi"/>
+        <a:font script="Cans" typeface="Euphemia"/>
+        <a:font script="Cher" typeface="Plantagenet Cherokee"/>
+        <a:font script="Yiii" typeface="Microsoft Yi Baiti"/>
+        <a:font script="Tibt" typeface="Microsoft Himalaya"/>
+        <a:font script="Thaa" typeface="MV Boli"/>
+        <a:font script="Deva" typeface="Mangal"/>
+        <a:font script="Telu" typeface="Gautami"/>
+        <a:font script="Taml" typeface="Latha"/>
+        <a:font script="Syrc" typeface="Estrangelo Edessa"/>
+        <a:font script="Orya" typeface="Kalinga"/>
+        <a:font script="Mlym" typeface="Kartika"/>
+        <a:font script="Laoo" typeface="DokChampa"/>
+        <a:font script="Sinh" typeface="Iskoola Pota"/>
+        <a:font script="Mong" typeface="Mongolian Baiti"/>
+        <a:font script="Viet" typeface="Times New Roman"/>
+        <a:font script="Uigh" typeface="Microsoft Uighur"/>
+      </a:minorFont>
+    </a:fontScheme>
+    <a:fmtScheme name="Office">
+      <a:fillStyleLst>
+        <a:solidFill>
+          <a:schemeClr val="phClr"/>
+        </a:solidFill>
+        <a:gradFill rotWithShape="1">
+          <a:gsLst>
+            <a:gs pos="0">
+              <a:schemeClr val="phClr">
+                <a:tint val="50000"/>
+                <a:satMod val="300000"/>
+              </a:schemeClr>
+            </a:gs>
+            <a:gs pos="35000">
+              <a:schemeClr val="phClr">
+                <a:tint val="37000"/>
+                <a:satMod val="300000"/>
+              </a:schemeClr>
+            </a:gs>
+            <a:gs pos="100000">
+              <a:schemeClr val="phClr">
+                <a:tint val="15000"/>
+                <a:satMod val="350000"/>
+              </a:schemeClr>
+            </a:gs>
+          </a:gsLst>
+          <a:lin ang="16200000" scaled="1"/>
+        </a:gradFill>
+        <a:gradFill rotWithShape="1">
+          <a:gsLst>
+            <a:gs pos="0">
+              <a:schemeClr val="phClr">
+                <a:tint val="100000"/>
+                <a:shade val="100000"/>
+                <a:satMod val="130000"/>
+              </a:schemeClr>
+            </a:gs>
+            <a:gs pos="100000">
+              <a:schemeClr val="phClr">
+                <a:tint val="50000"/>
+                <a:shade val="100000"/>
+                <a:satMod val="350000"/>
+              </a:schemeClr>
+            </a:gs>
+          </a:gsLst>
+          <a:lin ang="16200000" scaled="0"/>
+        </a:gradFill>
+      </a:fillStyleLst>
+      <a:lnStyleLst>
+        <a:ln cap="flat" cmpd="sng" w="9525" algn="ctr">
+          <a:solidFill>
+            <a:schemeClr val="phClr">
+              <a:shade val="95000"/>
+              <a:satMod val="105000"/>
+            </a:schemeClr>
+          </a:solidFill>
+          <a:prstDash val="solid"/>
+        </a:ln>
+        <a:ln cap="flat" cmpd="sng" w="25400" algn="ctr">
+          <a:solidFill>
+            <a:schemeClr val="phClr"/>
+          </a:solidFill>
+          <a:prstDash val="solid"/>
+        </a:ln>
+        <a:ln cap="flat" cmpd="sng" w="38100" algn="ctr">
+          <a:solidFill>
+            <a:schemeClr val="phClr"/>
+          </a:solidFill>
+          <a:prstDash val="solid"/>
+        </a:ln>
+      </a:lnStyleLst>
+      <a:effectStyleLst>
+        <a:effectStyle>
+          <a:effectLst>
+            <a:outerShdw blurRad="40000" rotWithShape="0" dir="5400000" dist="20000">
+              <a:srgbClr val="000000">
+                <a:alpha val="38000"/>
+              </a:srgbClr>
+            </a:outerShdw>
+          </a:effectLst>
+        </a:effectStyle>
+        <a:effectStyle>
+          <a:effectLst>
+            <a:outerShdw blurRad="40000" rotWithShape="0" dir="5400000" dist="23000">
+              <a:srgbClr val="000000">
+                <a:alpha val="35000"/>
+              </a:srgbClr>
+            </a:outerShdw>
+          </a:effectLst>
+        </a:effectStyle>
+        <a:effectStyle>
+          <a:effectLst>
+            <a:outerShdw blurRad="40000" rotWithShape="0" dir="5400000" dist="23000">
+              <a:srgbClr val="000000">
+                <a:alpha val="35000"/>
+              </a:srgbClr>
+            </a:outerShdw>
+          </a:effectLst>
+          <a:scene3d>
+            <a:camera prst="orthographicFront">
+              <a:rot lat="0" lon="0" rev="0"/>
+            </a:camera>
+            <a:lightRig dir="t" rig="threePt">
+              <a:rot lat="0" lon="0" rev="1200000"/>
+            </a:lightRig>
+          </a:scene3d>
+          <a:sp3d>
+            <a:bevelT h="25400" w="63500"/>
+          </a:sp3d>
+        </a:effectStyle>
+      </a:effectStyleLst>
+      <a:bgFillStyleLst>
+        <a:solidFill>
+          <a:schemeClr val="phClr"/>
+        </a:solidFill>
+        <a:gradFill rotWithShape="1">
+          <a:gsLst>
+            <a:gs pos="0">
+              <a:schemeClr val="phClr">
+                <a:tint val="40000"/>
+                <a:satMod val="350000"/>
+              </a:schemeClr>
+            </a:gs>
+            <a:gs pos="40000">
+              <a:schemeClr val="phClr">
+                <a:tint val="45000"/>
+                <a:shade val="99000"/>
+                <a:satMod val="350000"/>
+              </a:schemeClr>
+            </a:gs>
+            <a:gs pos="100000">
+              <a:schemeClr val="phClr">
+                <a:shade val="20000"/>
+                <a:satMod val="255000"/>
+              </a:schemeClr>
+            </a:gs>
+          </a:gsLst>
+          <a:path path="circle">
+            <a:fillToRect b="180000" l="50000" r="50000" t="-80000"/>
+          </a:path>
+        </a:gradFill>
+        <a:gradFill rotWithShape="1">
+          <a:gsLst>
+            <a:gs pos="0">
+              <a:schemeClr val="phClr">
+                <a:tint val="80000"/>
+                <a:satMod val="300000"/>
+              </a:schemeClr>
+            </a:gs>
+            <a:gs pos="100000">
+              <a:schemeClr val="phClr">
+                <a:shade val="30000"/>
+                <a:satMod val="200000"/>
+              </a:schemeClr>
+            </a:gs>
+          </a:gsLst>
+          <a:path path="circle">
+            <a:fillToRect b="50000" l="50000" r="50000" t="50000"/>
+          </a:path>
+        </a:gradFill>
+      </a:bgFillStyleLst>
+    </a:fmtScheme>
+  </a:themeElements>
+</a:theme>
+</file>
+
+<file path=ppt/theme/theme2.xml><?xml version="1.0" encoding="utf-8"?>
 <a:theme xmlns:a="http://schemas.openxmlformats.org/drawingml/2006/main" xmlns:r="http://schemas.openxmlformats.org/officeDocument/2006/relationships" name="Custom Theme">
   <a:themeElements>
     <a:clrScheme name="Default">
@@ -15054,7 +15220,7 @@
 </a:theme>
 </file>
 
-<file path=ppt/theme/theme2.xml><?xml version="1.0" encoding="utf-8"?>
+<file path=ppt/theme/theme3.xml><?xml version="1.0" encoding="utf-8"?>
 <a:theme xmlns:a="http://schemas.openxmlformats.org/drawingml/2006/main" xmlns:r="http://schemas.openxmlformats.org/officeDocument/2006/relationships" name="Office Theme">
   <a:themeElements>
     <a:clrScheme name="Office">
@@ -15369,281 +15535,4 @@
     </a:lnDef>
   </a:objectDefaults>
 </a:theme>
-</file>
-
-<file path=ppt/theme/theme3.xml><?xml version="1.0" encoding="utf-8"?>
-<a:theme xmlns:a="http://schemas.openxmlformats.org/drawingml/2006/main" xmlns:r="http://schemas.openxmlformats.org/officeDocument/2006/relationships" name="simple-light">
-  <a:themeElements>
-    <a:clrScheme name="Custom 347">
-      <a:dk1>
-        <a:srgbClr val="000000"/>
-      </a:dk1>
-      <a:lt1>
-        <a:srgbClr val="FFFFFF"/>
-      </a:lt1>
-      <a:dk2>
-        <a:srgbClr val="666666"/>
-      </a:dk2>
-      <a:lt2>
-        <a:srgbClr val="CCCCCC"/>
-      </a:lt2>
-      <a:accent1>
-        <a:srgbClr val="3A81BA"/>
-      </a:accent1>
-      <a:accent2>
-        <a:srgbClr val="D89F39"/>
-      </a:accent2>
-      <a:accent3>
-        <a:srgbClr val="8BAB42"/>
-      </a:accent3>
-      <a:accent4>
-        <a:srgbClr val="57A7B5"/>
-      </a:accent4>
-      <a:accent5>
-        <a:srgbClr val="8B81D2"/>
-      </a:accent5>
-      <a:accent6>
-        <a:srgbClr val="963334"/>
-      </a:accent6>
-      <a:hlink>
-        <a:srgbClr val="1155CC"/>
-      </a:hlink>
-      <a:folHlink>
-        <a:srgbClr val="6611CC"/>
-      </a:folHlink>
-    </a:clrScheme>
-    <a:fontScheme name="Office">
-      <a:majorFont>
-        <a:latin typeface="Arial"/>
-        <a:ea typeface=""/>
-        <a:cs typeface=""/>
-        <a:font script="Jpan" typeface="ＭＳ Ｐゴシック"/>
-        <a:font script="Hang" typeface="맑은 고딕"/>
-        <a:font script="Hans" typeface="宋体"/>
-        <a:font script="Hant" typeface="新細明體"/>
-        <a:font script="Arab" typeface="Times New Roman"/>
-        <a:font script="Hebr" typeface="Times New Roman"/>
-        <a:font script="Thai" typeface="Angsana New"/>
-        <a:font script="Ethi" typeface="Nyala"/>
-        <a:font script="Beng" typeface="Vrinda"/>
-        <a:font script="Gujr" typeface="Shruti"/>
-        <a:font script="Khmr" typeface="MoolBoran"/>
-        <a:font script="Knda" typeface="Tunga"/>
-        <a:font script="Guru" typeface="Raavi"/>
-        <a:font script="Cans" typeface="Euphemia"/>
-        <a:font script="Cher" typeface="Plantagenet Cherokee"/>
-        <a:font script="Yiii" typeface="Microsoft Yi Baiti"/>
-        <a:font script="Tibt" typeface="Microsoft Himalaya"/>
-        <a:font script="Thaa" typeface="MV Boli"/>
-        <a:font script="Deva" typeface="Mangal"/>
-        <a:font script="Telu" typeface="Gautami"/>
-        <a:font script="Taml" typeface="Latha"/>
-        <a:font script="Syrc" typeface="Estrangelo Edessa"/>
-        <a:font script="Orya" typeface="Kalinga"/>
-        <a:font script="Mlym" typeface="Kartika"/>
-        <a:font script="Laoo" typeface="DokChampa"/>
-        <a:font script="Sinh" typeface="Iskoola Pota"/>
-        <a:font script="Mong" typeface="Mongolian Baiti"/>
-        <a:font script="Viet" typeface="Times New Roman"/>
-        <a:font script="Uigh" typeface="Microsoft Uighur"/>
-      </a:majorFont>
-      <a:minorFont>
-        <a:latin typeface="Arial"/>
-        <a:ea typeface=""/>
-        <a:cs typeface=""/>
-        <a:font script="Jpan" typeface="ＭＳ Ｐゴシック"/>
-        <a:font script="Hang" typeface="맑은 고딕"/>
-        <a:font script="Hans" typeface="宋体"/>
-        <a:font script="Hant" typeface="新細明體"/>
-        <a:font script="Arab" typeface="Times New Roman"/>
-        <a:font script="Hebr" typeface="Times New Roman"/>
-        <a:font script="Thai" typeface="Angsana New"/>
-        <a:font script="Ethi" typeface="Nyala"/>
-        <a:font script="Beng" typeface="Vrinda"/>
-        <a:font script="Gujr" typeface="Shruti"/>
-        <a:font script="Khmr" typeface="MoolBoran"/>
-        <a:font script="Knda" typeface="Tunga"/>
-        <a:font script="Guru" typeface="Raavi"/>
-        <a:font script="Cans" typeface="Euphemia"/>
-        <a:font script="Cher" typeface="Plantagenet Cherokee"/>
-        <a:font script="Yiii" typeface="Microsoft Yi Baiti"/>
-        <a:font script="Tibt" typeface="Microsoft Himalaya"/>
-        <a:font script="Thaa" typeface="MV Boli"/>
-        <a:font script="Deva" typeface="Mangal"/>
-        <a:font script="Telu" typeface="Gautami"/>
-        <a:font script="Taml" typeface="Latha"/>
-        <a:font script="Syrc" typeface="Estrangelo Edessa"/>
-        <a:font script="Orya" typeface="Kalinga"/>
-        <a:font script="Mlym" typeface="Kartika"/>
-        <a:font script="Laoo" typeface="DokChampa"/>
-        <a:font script="Sinh" typeface="Iskoola Pota"/>
-        <a:font script="Mong" typeface="Mongolian Baiti"/>
-        <a:font script="Viet" typeface="Times New Roman"/>
-        <a:font script="Uigh" typeface="Microsoft Uighur"/>
-      </a:minorFont>
-    </a:fontScheme>
-    <a:fmtScheme name="Office">
-      <a:fillStyleLst>
-        <a:solidFill>
-          <a:schemeClr val="phClr"/>
-        </a:solidFill>
-        <a:gradFill rotWithShape="1">
-          <a:gsLst>
-            <a:gs pos="0">
-              <a:schemeClr val="phClr">
-                <a:tint val="50000"/>
-                <a:satMod val="300000"/>
-              </a:schemeClr>
-            </a:gs>
-            <a:gs pos="35000">
-              <a:schemeClr val="phClr">
-                <a:tint val="37000"/>
-                <a:satMod val="300000"/>
-              </a:schemeClr>
-            </a:gs>
-            <a:gs pos="100000">
-              <a:schemeClr val="phClr">
-                <a:tint val="15000"/>
-                <a:satMod val="350000"/>
-              </a:schemeClr>
-            </a:gs>
-          </a:gsLst>
-          <a:lin ang="16200000" scaled="1"/>
-        </a:gradFill>
-        <a:gradFill rotWithShape="1">
-          <a:gsLst>
-            <a:gs pos="0">
-              <a:schemeClr val="phClr">
-                <a:tint val="100000"/>
-                <a:shade val="100000"/>
-                <a:satMod val="130000"/>
-              </a:schemeClr>
-            </a:gs>
-            <a:gs pos="100000">
-              <a:schemeClr val="phClr">
-                <a:tint val="50000"/>
-                <a:shade val="100000"/>
-                <a:satMod val="350000"/>
-              </a:schemeClr>
-            </a:gs>
-          </a:gsLst>
-          <a:lin ang="16200000" scaled="0"/>
-        </a:gradFill>
-      </a:fillStyleLst>
-      <a:lnStyleLst>
-        <a:ln cap="flat" cmpd="sng" w="9525" algn="ctr">
-          <a:solidFill>
-            <a:schemeClr val="phClr">
-              <a:shade val="95000"/>
-              <a:satMod val="105000"/>
-            </a:schemeClr>
-          </a:solidFill>
-          <a:prstDash val="solid"/>
-        </a:ln>
-        <a:ln cap="flat" cmpd="sng" w="25400" algn="ctr">
-          <a:solidFill>
-            <a:schemeClr val="phClr"/>
-          </a:solidFill>
-          <a:prstDash val="solid"/>
-        </a:ln>
-        <a:ln cap="flat" cmpd="sng" w="38100" algn="ctr">
-          <a:solidFill>
-            <a:schemeClr val="phClr"/>
-          </a:solidFill>
-          <a:prstDash val="solid"/>
-        </a:ln>
-      </a:lnStyleLst>
-      <a:effectStyleLst>
-        <a:effectStyle>
-          <a:effectLst>
-            <a:outerShdw blurRad="40000" rotWithShape="0" dir="5400000" dist="20000">
-              <a:srgbClr val="000000">
-                <a:alpha val="38000"/>
-              </a:srgbClr>
-            </a:outerShdw>
-          </a:effectLst>
-        </a:effectStyle>
-        <a:effectStyle>
-          <a:effectLst>
-            <a:outerShdw blurRad="40000" rotWithShape="0" dir="5400000" dist="23000">
-              <a:srgbClr val="000000">
-                <a:alpha val="35000"/>
-              </a:srgbClr>
-            </a:outerShdw>
-          </a:effectLst>
-        </a:effectStyle>
-        <a:effectStyle>
-          <a:effectLst>
-            <a:outerShdw blurRad="40000" rotWithShape="0" dir="5400000" dist="23000">
-              <a:srgbClr val="000000">
-                <a:alpha val="35000"/>
-              </a:srgbClr>
-            </a:outerShdw>
-          </a:effectLst>
-          <a:scene3d>
-            <a:camera prst="orthographicFront">
-              <a:rot lat="0" lon="0" rev="0"/>
-            </a:camera>
-            <a:lightRig dir="t" rig="threePt">
-              <a:rot lat="0" lon="0" rev="1200000"/>
-            </a:lightRig>
-          </a:scene3d>
-          <a:sp3d>
-            <a:bevelT h="25400" w="63500"/>
-          </a:sp3d>
-        </a:effectStyle>
-      </a:effectStyleLst>
-      <a:bgFillStyleLst>
-        <a:solidFill>
-          <a:schemeClr val="phClr"/>
-        </a:solidFill>
-        <a:gradFill rotWithShape="1">
-          <a:gsLst>
-            <a:gs pos="0">
-              <a:schemeClr val="phClr">
-                <a:tint val="40000"/>
-                <a:satMod val="350000"/>
-              </a:schemeClr>
-            </a:gs>
-            <a:gs pos="40000">
-              <a:schemeClr val="phClr">
-                <a:tint val="45000"/>
-                <a:shade val="99000"/>
-                <a:satMod val="350000"/>
-              </a:schemeClr>
-            </a:gs>
-            <a:gs pos="100000">
-              <a:schemeClr val="phClr">
-                <a:shade val="20000"/>
-                <a:satMod val="255000"/>
-              </a:schemeClr>
-            </a:gs>
-          </a:gsLst>
-          <a:path path="circle">
-            <a:fillToRect b="180000" l="50000" r="50000" t="-80000"/>
-          </a:path>
-        </a:gradFill>
-        <a:gradFill rotWithShape="1">
-          <a:gsLst>
-            <a:gs pos="0">
-              <a:schemeClr val="phClr">
-                <a:tint val="80000"/>
-                <a:satMod val="300000"/>
-              </a:schemeClr>
-            </a:gs>
-            <a:gs pos="100000">
-              <a:schemeClr val="phClr">
-                <a:shade val="30000"/>
-                <a:satMod val="200000"/>
-              </a:schemeClr>
-            </a:gs>
-          </a:gsLst>
-          <a:path path="circle">
-            <a:fillToRect b="50000" l="50000" r="50000" t="50000"/>
-          </a:path>
-        </a:gradFill>
-      </a:bgFillStyleLst>
-    </a:fmtScheme>
-  </a:themeElements>
-</a:theme>
 </file>
</xml_diff>